<commit_message>
Updates from Jim via email (2021-04-02)
</commit_message>
<xml_diff>
--- a/final-presentations/2021-04-12-ecpam/05-summary.pptx
+++ b/final-presentations/2021-04-12-ecpam/05-summary.pptx
@@ -5,24 +5,20 @@
     <p:sldMasterId id="2147483935" r:id="rId4"/>
   </p:sldMasterIdLst>
   <p:notesMasterIdLst>
-    <p:notesMasterId r:id="rId17"/>
+    <p:notesMasterId r:id="rId13"/>
   </p:notesMasterIdLst>
   <p:handoutMasterIdLst>
-    <p:handoutMasterId r:id="rId18"/>
+    <p:handoutMasterId r:id="rId14"/>
   </p:handoutMasterIdLst>
   <p:sldIdLst>
     <p:sldId id="318" r:id="rId5"/>
     <p:sldId id="320" r:id="rId6"/>
-    <p:sldId id="1840" r:id="rId7"/>
-    <p:sldId id="1841" r:id="rId8"/>
-    <p:sldId id="1842" r:id="rId9"/>
-    <p:sldId id="1843" r:id="rId10"/>
-    <p:sldId id="1819" r:id="rId11"/>
-    <p:sldId id="1844" r:id="rId12"/>
-    <p:sldId id="1830" r:id="rId13"/>
-    <p:sldId id="1846" r:id="rId14"/>
-    <p:sldId id="1845" r:id="rId15"/>
-    <p:sldId id="1847" r:id="rId16"/>
+    <p:sldId id="1848" r:id="rId7"/>
+    <p:sldId id="1844" r:id="rId8"/>
+    <p:sldId id="1830" r:id="rId9"/>
+    <p:sldId id="1846" r:id="rId10"/>
+    <p:sldId id="1845" r:id="rId11"/>
+    <p:sldId id="1847" r:id="rId12"/>
   </p:sldIdLst>
   <p:sldSz cx="12188825" cy="6858000"/>
   <p:notesSz cx="7010400" cy="9296400"/>
@@ -266,7 +262,7 @@
           <a:p>
             <a:fld id="{0B842F42-2CE9-4E35-95C1-410DC08A50B1}" type="datetimeFigureOut">
               <a:rPr lang="en-US" smtClean="0"/>
-              <a:t>10/2/2020</a:t>
+              <a:t>4/2/21</a:t>
             </a:fld>
             <a:endParaRPr lang="en-US"/>
           </a:p>
@@ -431,7 +427,7 @@
           <a:p>
             <a:fld id="{6F282904-F315-4730-8D91-37D99E141A6F}" type="datetimeFigureOut">
               <a:rPr lang="en-US" smtClean="0"/>
-              <a:t>10/2/2020</a:t>
+              <a:t>4/2/21</a:t>
             </a:fld>
             <a:endParaRPr lang="en-US"/>
           </a:p>
@@ -3592,27 +3588,45 @@
           <a:bodyPr/>
           <a:lstStyle/>
           <a:p>
+            <a:endParaRPr lang="en-US" u="sng" dirty="0"/>
+          </a:p>
+          <a:p>
             <a:r>
               <a:rPr lang="en-US" u="sng" dirty="0"/>
-              <a:t>David E. Bernholdt</a:t>
-            </a:r>
-            <a:r>
-              <a:rPr lang="en-US" dirty="0"/>
-              <a:t>, David Rogers</a:t>
+              <a:t>James M. </a:t>
+            </a:r>
+            <a:r>
+              <a:rPr lang="en-US" u="sng" dirty="0" err="1"/>
+              <a:t>Willenbring</a:t>
             </a:r>
             <a:br>
               <a:rPr lang="en-US" u="sng" dirty="0"/>
             </a:br>
             <a:r>
               <a:rPr lang="en-US" sz="2000" dirty="0"/>
+              <a:t>Sandia National Laboratories</a:t>
+            </a:r>
+            <a:endParaRPr lang="en-US" u="sng" dirty="0"/>
+          </a:p>
+          <a:p>
+            <a:r>
+              <a:rPr lang="en-US" u="sng" dirty="0"/>
+              <a:t>David E. Bernholdt</a:t>
+            </a:r>
+            <a:r>
+              <a:rPr lang="en-US" dirty="0"/>
+              <a:t>, David Rogers</a:t>
+            </a:r>
+            <a:br>
+              <a:rPr lang="en-US" u="sng" dirty="0"/>
+            </a:br>
+            <a:r>
+              <a:rPr lang="en-US" sz="2000" dirty="0"/>
               <a:t>Oak Ridge National Laboratory</a:t>
             </a:r>
           </a:p>
           <a:p>
-            <a:r>
-              <a:rPr lang="en-US" sz="2000" dirty="0"/>
-              <a:t>Better Scientific Software Tutorial, SC20, November 2020</a:t>
-            </a:r>
+            <a:endParaRPr lang="en-US" sz="2000" dirty="0"/>
           </a:p>
         </p:txBody>
       </p:sp>
@@ -3752,7 +3766,953 @@
 </p:sld>
 </file>
 
-<file path=ppt/slides/slide10.xml><?xml version="1.0" encoding="utf-8"?>
+<file path=ppt/slides/slide2.xml><?xml version="1.0" encoding="utf-8"?>
+<p:sld xmlns:a="http://schemas.openxmlformats.org/drawingml/2006/main" xmlns:r="http://schemas.openxmlformats.org/officeDocument/2006/relationships" xmlns:p="http://schemas.openxmlformats.org/presentationml/2006/main">
+  <p:cSld>
+    <p:spTree>
+      <p:nvGrpSpPr>
+        <p:cNvPr id="1" name=""/>
+        <p:cNvGrpSpPr/>
+        <p:nvPr/>
+      </p:nvGrpSpPr>
+      <p:grpSpPr>
+        <a:xfrm>
+          <a:off x="0" y="0"/>
+          <a:ext cx="0" cy="0"/>
+          <a:chOff x="0" y="0"/>
+          <a:chExt cx="0" cy="0"/>
+        </a:xfrm>
+      </p:grpSpPr>
+      <p:sp>
+        <p:nvSpPr>
+          <p:cNvPr id="2" name="Title 1">
+            <a:extLst>
+              <a:ext uri="{FF2B5EF4-FFF2-40B4-BE49-F238E27FC236}">
+                <a16:creationId xmlns:a16="http://schemas.microsoft.com/office/drawing/2014/main" id="{6442C24D-D970-4D40-8F14-D70C10A96304}"/>
+              </a:ext>
+            </a:extLst>
+          </p:cNvPr>
+          <p:cNvSpPr>
+            <a:spLocks noGrp="1"/>
+          </p:cNvSpPr>
+          <p:nvPr>
+            <p:ph type="title"/>
+          </p:nvPr>
+        </p:nvSpPr>
+        <p:spPr>
+          <a:xfrm>
+            <a:off x="363096" y="112911"/>
+            <a:ext cx="11372473" cy="914400"/>
+          </a:xfrm>
+        </p:spPr>
+        <p:txBody>
+          <a:bodyPr/>
+          <a:lstStyle/>
+          <a:p>
+            <a:r>
+              <a:rPr lang="en-US" dirty="0"/>
+              <a:t>License, Citation and Acknowledgements</a:t>
+            </a:r>
+          </a:p>
+        </p:txBody>
+      </p:sp>
+      <p:sp>
+        <p:nvSpPr>
+          <p:cNvPr id="3" name="Content Placeholder 2">
+            <a:extLst>
+              <a:ext uri="{FF2B5EF4-FFF2-40B4-BE49-F238E27FC236}">
+                <a16:creationId xmlns:a16="http://schemas.microsoft.com/office/drawing/2014/main" id="{0385A3AB-B258-4D59-B407-F7D57545A163}"/>
+              </a:ext>
+            </a:extLst>
+          </p:cNvPr>
+          <p:cNvSpPr>
+            <a:spLocks noGrp="1"/>
+          </p:cNvSpPr>
+          <p:nvPr>
+            <p:ph idx="1"/>
+          </p:nvPr>
+        </p:nvSpPr>
+        <p:spPr>
+          <a:xfrm>
+            <a:off x="409507" y="570111"/>
+            <a:ext cx="11369809" cy="4047778"/>
+          </a:xfrm>
+        </p:spPr>
+        <p:txBody>
+          <a:bodyPr/>
+          <a:lstStyle/>
+          <a:p>
+            <a:pPr marL="0" indent="0">
+              <a:buNone/>
+            </a:pPr>
+            <a:r>
+              <a:rPr lang="en-US" sz="2000" b="1" dirty="0"/>
+              <a:t>License and Citation</a:t>
+            </a:r>
+          </a:p>
+          <a:p>
+            <a:pPr>
+              <a:spcBef>
+                <a:spcPts val="400"/>
+              </a:spcBef>
+            </a:pPr>
+            <a:r>
+              <a:rPr lang="en-US" sz="1600" dirty="0"/>
+              <a:t>This work is licensed under a </a:t>
+            </a:r>
+            <a:r>
+              <a:rPr lang="en-US" sz="1600" dirty="0">
+                <a:hlinkClick r:id="rId2"/>
+              </a:rPr>
+              <a:t>Creative</a:t>
+            </a:r>
+            <a:r>
+              <a:rPr lang="en-US" sz="1600" dirty="0">
+                <a:hlinkClick r:id="rId3"/>
+              </a:rPr>
+              <a:t> Commons Attribution 4.0 International License</a:t>
+            </a:r>
+            <a:r>
+              <a:rPr lang="en-US" sz="1600" dirty="0"/>
+              <a:t> (CC BY 4.0).</a:t>
+            </a:r>
+          </a:p>
+          <a:p>
+            <a:pPr>
+              <a:spcBef>
+                <a:spcPts val="400"/>
+              </a:spcBef>
+            </a:pPr>
+            <a:r>
+              <a:rPr lang="en-US" sz="1600" b="1" dirty="0"/>
+              <a:t>The requested citation the overall tutorial is: David E. Bernholdt, Anshu Dubey, Patricia A. Grubel, Rinku K. Gupta, Better Scientific Software tutorial, in SC ‘20: International Conference for High Performance Computing, Networking, Storage and Analysis, online, 2020. DOI: </a:t>
+            </a:r>
+            <a:r>
+              <a:rPr lang="en-US" sz="1600" b="1" dirty="0">
+                <a:hlinkClick r:id="rId4"/>
+              </a:rPr>
+              <a:t>10.6084/m9.figshare.12994376</a:t>
+            </a:r>
+            <a:endParaRPr lang="en-US" sz="1600" b="1" dirty="0"/>
+          </a:p>
+          <a:p>
+            <a:pPr>
+              <a:spcBef>
+                <a:spcPts val="400"/>
+              </a:spcBef>
+            </a:pPr>
+            <a:r>
+              <a:rPr lang="en-US" sz="1600" dirty="0"/>
+              <a:t>Individual modules may be cited as </a:t>
+            </a:r>
+            <a:r>
+              <a:rPr lang="en-US" sz="1600" i="1" dirty="0"/>
+              <a:t>Speaker, Module Title</a:t>
+            </a:r>
+            <a:r>
+              <a:rPr lang="en-US" sz="1600" dirty="0"/>
+              <a:t>, in Better Scientific Software tutorial…</a:t>
+            </a:r>
+          </a:p>
+          <a:p>
+            <a:pPr marL="0" indent="0">
+              <a:spcBef>
+                <a:spcPts val="800"/>
+              </a:spcBef>
+              <a:buNone/>
+            </a:pPr>
+            <a:r>
+              <a:rPr lang="en-US" sz="2000" b="1" dirty="0"/>
+              <a:t>Acknowledgements</a:t>
+            </a:r>
+          </a:p>
+          <a:p>
+            <a:pPr>
+              <a:spcBef>
+                <a:spcPts val="400"/>
+              </a:spcBef>
+            </a:pPr>
+            <a:r>
+              <a:rPr lang="en-US" sz="1400" dirty="0"/>
+              <a:t>Additional contributors include: Mike </a:t>
+            </a:r>
+            <a:r>
+              <a:rPr lang="en-US" sz="1400" dirty="0" err="1"/>
+              <a:t>Heroux</a:t>
+            </a:r>
+            <a:r>
+              <a:rPr lang="en-US" sz="1400" dirty="0"/>
+              <a:t>, Alicia </a:t>
+            </a:r>
+            <a:r>
+              <a:rPr lang="en-US" sz="1400" dirty="0" err="1"/>
+              <a:t>Klinvex</a:t>
+            </a:r>
+            <a:r>
+              <a:rPr lang="en-US" sz="1400" dirty="0"/>
+              <a:t>, Mark Miller, Jared O’Neal, Katherine Riley, David Rogers, Deborah Stevens, James </a:t>
+            </a:r>
+            <a:r>
+              <a:rPr lang="en-US" sz="1400" dirty="0" err="1"/>
+              <a:t>Willenbring</a:t>
+            </a:r>
+            <a:endParaRPr lang="en-US" sz="1400" dirty="0"/>
+          </a:p>
+          <a:p>
+            <a:pPr>
+              <a:spcBef>
+                <a:spcPts val="400"/>
+              </a:spcBef>
+            </a:pPr>
+            <a:r>
+              <a:rPr lang="en-US" sz="1400" dirty="0"/>
+              <a:t>This work was supported by the U.S. Department of Energy Office of Science, Office of Advanced Scientific Computing Research (ASCR), and by the </a:t>
+            </a:r>
+            <a:r>
+              <a:rPr lang="en-US" sz="1400" dirty="0" err="1"/>
+              <a:t>Exascale</a:t>
+            </a:r>
+            <a:r>
+              <a:rPr lang="en-US" sz="1400" dirty="0"/>
+              <a:t> Computing Project (17-SC-20-SC), a collaborative effort of the U.S. Department of Energy Office of Science and the National Nuclear Security Administration</a:t>
+            </a:r>
+            <a:r>
+              <a:rPr lang="en-US" sz="1400" i="1" dirty="0"/>
+              <a:t>.</a:t>
+            </a:r>
+            <a:endParaRPr lang="en-US" sz="1400" dirty="0"/>
+          </a:p>
+          <a:p>
+            <a:pPr>
+              <a:spcBef>
+                <a:spcPts val="400"/>
+              </a:spcBef>
+            </a:pPr>
+            <a:r>
+              <a:rPr lang="en-US" sz="1400" dirty="0"/>
+              <a:t>This work was performed in part at the Argonne National Laboratory, which is managed by </a:t>
+            </a:r>
+            <a:r>
+              <a:rPr lang="en-US" sz="1400" dirty="0" err="1"/>
+              <a:t>UChicago</a:t>
+            </a:r>
+            <a:r>
+              <a:rPr lang="en-US" sz="1400" dirty="0"/>
+              <a:t> Argonne, LLC for the U.S. Department of Energy under Contract No. DE-AC02-06CH11357.</a:t>
+            </a:r>
+          </a:p>
+          <a:p>
+            <a:pPr>
+              <a:spcBef>
+                <a:spcPts val="400"/>
+              </a:spcBef>
+            </a:pPr>
+            <a:r>
+              <a:rPr lang="en-US" sz="1400" dirty="0"/>
+              <a:t>This work was performed in part at the Oak Ridge National Laboratory, which is managed by UT-Battelle, LLC for the U.S. Department of Energy under Contract No. DE-AC05-00OR22725.</a:t>
+            </a:r>
+          </a:p>
+          <a:p>
+            <a:pPr>
+              <a:spcBef>
+                <a:spcPts val="400"/>
+              </a:spcBef>
+            </a:pPr>
+            <a:r>
+              <a:rPr lang="en-US" sz="1400" dirty="0"/>
+              <a:t>This work was performed in part at the Lawrence Livermore National Laboratory, which is managed by Lawrence Livermore National Security, LLC for the U.S. Department of Energy under Contract No. DE-AC52-07NA27344.</a:t>
+            </a:r>
+          </a:p>
+          <a:p>
+            <a:pPr>
+              <a:spcBef>
+                <a:spcPts val="400"/>
+              </a:spcBef>
+            </a:pPr>
+            <a:r>
+              <a:rPr lang="en-US" sz="1400" dirty="0"/>
+              <a:t>This work was performed in part at the Los Alamos National Laboratory, which is managed by Triad National Security, LLC for the U.S. Department of Energy under Contract No.89233218CNA000001</a:t>
+            </a:r>
+          </a:p>
+          <a:p>
+            <a:pPr>
+              <a:spcBef>
+                <a:spcPts val="400"/>
+              </a:spcBef>
+            </a:pPr>
+            <a:r>
+              <a:rPr lang="en-US" sz="1400" dirty="0"/>
+              <a:t>This work was performed in part at Sandia National Laboratories. Sandia National Laboratories is a multi-mission laboratory managed and operated by National Technology and Engineering Solutions of Sandia, LLC., a wholly owned subsidiary of Honeywell International, Inc., for the U.S. Department of Energy’s National Nuclear Security Administration under contract DE-NA0003525.</a:t>
+            </a:r>
+          </a:p>
+        </p:txBody>
+      </p:sp>
+      <p:pic>
+        <p:nvPicPr>
+          <p:cNvPr id="4" name="Picture 2" descr="https://licensebuttons.net/l/by/4.0/88x31.png">
+            <a:extLst>
+              <a:ext uri="{FF2B5EF4-FFF2-40B4-BE49-F238E27FC236}">
+                <a16:creationId xmlns:a16="http://schemas.microsoft.com/office/drawing/2014/main" id="{61840015-22A0-4634-A2DE-AA05F998FD3A}"/>
+              </a:ext>
+            </a:extLst>
+          </p:cNvPr>
+          <p:cNvPicPr>
+            <a:picLocks noChangeAspect="1" noChangeArrowheads="1"/>
+          </p:cNvPicPr>
+          <p:nvPr/>
+        </p:nvPicPr>
+        <p:blipFill>
+          <a:blip r:embed="rId5">
+            <a:extLst>
+              <a:ext uri="{28A0092B-C50C-407E-A947-70E740481C1C}">
+                <a14:useLocalDpi xmlns:a14="http://schemas.microsoft.com/office/drawing/2010/main" val="0"/>
+              </a:ext>
+            </a:extLst>
+          </a:blip>
+          <a:srcRect/>
+          <a:stretch>
+            <a:fillRect/>
+          </a:stretch>
+        </p:blipFill>
+        <p:spPr bwMode="auto">
+          <a:xfrm>
+            <a:off x="10249254" y="570111"/>
+            <a:ext cx="1661258" cy="585216"/>
+          </a:xfrm>
+          <a:prstGeom prst="rect">
+            <a:avLst/>
+          </a:prstGeom>
+          <a:noFill/>
+          <a:extLst>
+            <a:ext uri="{909E8E84-426E-40DD-AFC4-6F175D3DCCD1}">
+              <a14:hiddenFill xmlns:a14="http://schemas.microsoft.com/office/drawing/2010/main">
+                <a:solidFill>
+                  <a:srgbClr val="FFFFFF"/>
+                </a:solidFill>
+              </a14:hiddenFill>
+            </a:ext>
+          </a:extLst>
+        </p:spPr>
+      </p:pic>
+    </p:spTree>
+    <p:extLst>
+      <p:ext uri="{BB962C8B-B14F-4D97-AF65-F5344CB8AC3E}">
+        <p14:creationId xmlns:p14="http://schemas.microsoft.com/office/powerpoint/2010/main" val="978726433"/>
+      </p:ext>
+    </p:extLst>
+  </p:cSld>
+  <p:clrMapOvr>
+    <a:masterClrMapping/>
+  </p:clrMapOvr>
+</p:sld>
+</file>
+
+<file path=ppt/slides/slide3.xml><?xml version="1.0" encoding="utf-8"?>
+<p:sld xmlns:a="http://schemas.openxmlformats.org/drawingml/2006/main" xmlns:r="http://schemas.openxmlformats.org/officeDocument/2006/relationships" xmlns:p="http://schemas.openxmlformats.org/presentationml/2006/main">
+  <p:cSld>
+    <p:spTree>
+      <p:nvGrpSpPr>
+        <p:cNvPr id="1" name=""/>
+        <p:cNvGrpSpPr/>
+        <p:nvPr/>
+      </p:nvGrpSpPr>
+      <p:grpSpPr>
+        <a:xfrm>
+          <a:off x="0" y="0"/>
+          <a:ext cx="0" cy="0"/>
+          <a:chOff x="0" y="0"/>
+          <a:chExt cx="0" cy="0"/>
+        </a:xfrm>
+      </p:grpSpPr>
+      <p:sp>
+        <p:nvSpPr>
+          <p:cNvPr id="2" name="Title 1">
+            <a:extLst>
+              <a:ext uri="{FF2B5EF4-FFF2-40B4-BE49-F238E27FC236}">
+                <a16:creationId xmlns:a16="http://schemas.microsoft.com/office/drawing/2014/main" id="{E134E470-AE6F-8A40-8A24-95746CEF4F9B}"/>
+              </a:ext>
+            </a:extLst>
+          </p:cNvPr>
+          <p:cNvSpPr>
+            <a:spLocks noGrp="1"/>
+          </p:cNvSpPr>
+          <p:nvPr>
+            <p:ph type="title"/>
+          </p:nvPr>
+        </p:nvSpPr>
+        <p:spPr/>
+        <p:txBody>
+          <a:bodyPr/>
+          <a:lstStyle/>
+          <a:p>
+            <a:r>
+              <a:rPr lang="en-US" dirty="0"/>
+              <a:t>Testing Matters (Maybe even more than you think)</a:t>
+            </a:r>
+          </a:p>
+        </p:txBody>
+      </p:sp>
+      <p:pic>
+        <p:nvPicPr>
+          <p:cNvPr id="5" name="Content Placeholder 4">
+            <a:extLst>
+              <a:ext uri="{FF2B5EF4-FFF2-40B4-BE49-F238E27FC236}">
+                <a16:creationId xmlns:a16="http://schemas.microsoft.com/office/drawing/2014/main" id="{6385ACAB-F526-774F-AEA8-9F61A1A519BD}"/>
+              </a:ext>
+            </a:extLst>
+          </p:cNvPr>
+          <p:cNvPicPr>
+            <a:picLocks noGrp="1" noChangeAspect="1"/>
+          </p:cNvPicPr>
+          <p:nvPr>
+            <p:ph idx="1"/>
+          </p:nvPr>
+        </p:nvPicPr>
+        <p:blipFill>
+          <a:blip r:embed="rId2">
+            <a:extLst>
+              <a:ext uri="{28A0092B-C50C-407E-A947-70E740481C1C}">
+                <a14:useLocalDpi xmlns:a14="http://schemas.microsoft.com/office/drawing/2010/main" val="0"/>
+              </a:ext>
+            </a:extLst>
+          </a:blip>
+          <a:stretch>
+            <a:fillRect/>
+          </a:stretch>
+        </p:blipFill>
+        <p:spPr>
+          <a:xfrm>
+            <a:off x="450592" y="868680"/>
+            <a:ext cx="9792086" cy="4048125"/>
+          </a:xfrm>
+        </p:spPr>
+      </p:pic>
+      <p:sp>
+        <p:nvSpPr>
+          <p:cNvPr id="7" name="TextBox 6">
+            <a:extLst>
+              <a:ext uri="{FF2B5EF4-FFF2-40B4-BE49-F238E27FC236}">
+                <a16:creationId xmlns:a16="http://schemas.microsoft.com/office/drawing/2014/main" id="{9A25C1AD-ABD7-0C40-9846-EFEDD7FBC35B}"/>
+              </a:ext>
+            </a:extLst>
+          </p:cNvPr>
+          <p:cNvSpPr txBox="1"/>
+          <p:nvPr/>
+        </p:nvSpPr>
+        <p:spPr>
+          <a:xfrm>
+            <a:off x="685800" y="5022082"/>
+            <a:ext cx="9556878" cy="1015663"/>
+          </a:xfrm>
+          <a:prstGeom prst="rect">
+            <a:avLst/>
+          </a:prstGeom>
+          <a:noFill/>
+        </p:spPr>
+        <p:txBody>
+          <a:bodyPr wrap="square" lIns="118872" tIns="91440" rIns="118872" bIns="91440" rtlCol="0" anchor="ctr" anchorCtr="0">
+            <a:spAutoFit/>
+          </a:bodyPr>
+          <a:lstStyle/>
+          <a:p>
+            <a:pPr marL="285750" indent="-285750" algn="l">
+              <a:lnSpc>
+                <a:spcPct val="90000"/>
+              </a:lnSpc>
+              <a:buFont typeface="Arial" panose="020B0604020202020204" pitchFamily="34" charset="0"/>
+              <a:buChar char="•"/>
+            </a:pPr>
+            <a:r>
+              <a:rPr lang="en-US" sz="2000" dirty="0"/>
+              <a:t>Individual project test suites are the basis for many layers of testing</a:t>
+            </a:r>
+          </a:p>
+          <a:p>
+            <a:pPr marL="742950" lvl="1" indent="-285750">
+              <a:lnSpc>
+                <a:spcPct val="90000"/>
+              </a:lnSpc>
+              <a:buFont typeface="Arial" panose="020B0604020202020204" pitchFamily="34" charset="0"/>
+              <a:buChar char="•"/>
+            </a:pPr>
+            <a:r>
+              <a:rPr lang="en-US" sz="2000" dirty="0"/>
+              <a:t>Well constructed tests add to confidence in and stability of code</a:t>
+            </a:r>
+          </a:p>
+          <a:p>
+            <a:pPr marL="742950" lvl="1" indent="-285750">
+              <a:lnSpc>
+                <a:spcPct val="90000"/>
+              </a:lnSpc>
+              <a:buFont typeface="Arial" panose="020B0604020202020204" pitchFamily="34" charset="0"/>
+              <a:buChar char="•"/>
+            </a:pPr>
+            <a:r>
+              <a:rPr lang="en-US" sz="2000" dirty="0"/>
+              <a:t>Fragile or insufficient test suites lead to errors and frustration</a:t>
+            </a:r>
+          </a:p>
+        </p:txBody>
+      </p:sp>
+    </p:spTree>
+    <p:extLst>
+      <p:ext uri="{BB962C8B-B14F-4D97-AF65-F5344CB8AC3E}">
+        <p14:creationId xmlns:p14="http://schemas.microsoft.com/office/powerpoint/2010/main" val="2791670428"/>
+      </p:ext>
+    </p:extLst>
+  </p:cSld>
+  <p:clrMapOvr>
+    <a:masterClrMapping/>
+  </p:clrMapOvr>
+</p:sld>
+</file>
+
+<file path=ppt/slides/slide4.xml><?xml version="1.0" encoding="utf-8"?>
+<p:sld xmlns:a="http://schemas.openxmlformats.org/drawingml/2006/main" xmlns:r="http://schemas.openxmlformats.org/officeDocument/2006/relationships" xmlns:p="http://schemas.openxmlformats.org/presentationml/2006/main">
+  <p:cSld>
+    <p:spTree>
+      <p:nvGrpSpPr>
+        <p:cNvPr id="1" name=""/>
+        <p:cNvGrpSpPr/>
+        <p:nvPr/>
+      </p:nvGrpSpPr>
+      <p:grpSpPr>
+        <a:xfrm>
+          <a:off x="0" y="0"/>
+          <a:ext cx="0" cy="0"/>
+          <a:chOff x="0" y="0"/>
+          <a:chExt cx="0" cy="0"/>
+        </a:xfrm>
+      </p:grpSpPr>
+      <p:sp>
+        <p:nvSpPr>
+          <p:cNvPr id="2" name="Title 1">
+            <a:extLst>
+              <a:ext uri="{FF2B5EF4-FFF2-40B4-BE49-F238E27FC236}">
+                <a16:creationId xmlns:a16="http://schemas.microsoft.com/office/drawing/2014/main" id="{0DDB3257-4000-436D-A7C3-75FA1E751AA5}"/>
+              </a:ext>
+            </a:extLst>
+          </p:cNvPr>
+          <p:cNvSpPr>
+            <a:spLocks noGrp="1"/>
+          </p:cNvSpPr>
+          <p:nvPr>
+            <p:ph type="title"/>
+          </p:nvPr>
+        </p:nvSpPr>
+        <p:spPr/>
+        <p:txBody>
+          <a:bodyPr/>
+          <a:lstStyle/>
+          <a:p>
+            <a:r>
+              <a:rPr lang="en-US" dirty="0"/>
+              <a:t>We Covered Software Engineering Topics Focused on Testing…</a:t>
+            </a:r>
+          </a:p>
+        </p:txBody>
+      </p:sp>
+      <p:sp>
+        <p:nvSpPr>
+          <p:cNvPr id="3" name="Content Placeholder 2">
+            <a:extLst>
+              <a:ext uri="{FF2B5EF4-FFF2-40B4-BE49-F238E27FC236}">
+                <a16:creationId xmlns:a16="http://schemas.microsoft.com/office/drawing/2014/main" id="{83604F36-B0F4-4052-B41C-CEB4982754BF}"/>
+              </a:ext>
+            </a:extLst>
+          </p:cNvPr>
+          <p:cNvSpPr>
+            <a:spLocks noGrp="1"/>
+          </p:cNvSpPr>
+          <p:nvPr>
+            <p:ph idx="1"/>
+          </p:nvPr>
+        </p:nvSpPr>
+        <p:spPr/>
+        <p:txBody>
+          <a:bodyPr/>
+          <a:lstStyle/>
+          <a:p>
+            <a:r>
+              <a:rPr lang="en-US" dirty="0"/>
+              <a:t>Testing strategies for complex software systems</a:t>
+            </a:r>
+          </a:p>
+          <a:p>
+            <a:r>
+              <a:rPr lang="en-US" dirty="0"/>
+              <a:t>Continuous integration testing</a:t>
+            </a:r>
+          </a:p>
+        </p:txBody>
+      </p:sp>
+    </p:spTree>
+    <p:extLst>
+      <p:ext uri="{BB962C8B-B14F-4D97-AF65-F5344CB8AC3E}">
+        <p14:creationId xmlns:p14="http://schemas.microsoft.com/office/powerpoint/2010/main" val="4009266668"/>
+      </p:ext>
+    </p:extLst>
+  </p:cSld>
+  <p:clrMapOvr>
+    <a:masterClrMapping/>
+  </p:clrMapOvr>
+</p:sld>
+</file>
+
+<file path=ppt/slides/slide5.xml><?xml version="1.0" encoding="utf-8"?>
+<p:sld xmlns:a="http://schemas.openxmlformats.org/drawingml/2006/main" xmlns:r="http://schemas.openxmlformats.org/officeDocument/2006/relationships" xmlns:p="http://schemas.openxmlformats.org/presentationml/2006/main">
+  <p:cSld>
+    <p:spTree>
+      <p:nvGrpSpPr>
+        <p:cNvPr id="1" name=""/>
+        <p:cNvGrpSpPr/>
+        <p:nvPr/>
+      </p:nvGrpSpPr>
+      <p:grpSpPr>
+        <a:xfrm>
+          <a:off x="0" y="0"/>
+          <a:ext cx="0" cy="0"/>
+          <a:chOff x="0" y="0"/>
+          <a:chExt cx="0" cy="0"/>
+        </a:xfrm>
+      </p:grpSpPr>
+      <p:sp>
+        <p:nvSpPr>
+          <p:cNvPr id="2" name="Title 1">
+            <a:extLst>
+              <a:ext uri="{FF2B5EF4-FFF2-40B4-BE49-F238E27FC236}">
+                <a16:creationId xmlns:a16="http://schemas.microsoft.com/office/drawing/2014/main" id="{4716E6A3-96EC-4523-A436-014C2E270151}"/>
+              </a:ext>
+            </a:extLst>
+          </p:cNvPr>
+          <p:cNvSpPr>
+            <a:spLocks noGrp="1"/>
+          </p:cNvSpPr>
+          <p:nvPr>
+            <p:ph type="title"/>
+          </p:nvPr>
+        </p:nvSpPr>
+        <p:spPr/>
+        <p:txBody>
+          <a:bodyPr/>
+          <a:lstStyle/>
+          <a:p>
+            <a:r>
+              <a:rPr lang="en-US" dirty="0"/>
+              <a:t>And there are Many More Topics We Didn’t Have Time For</a:t>
+            </a:r>
+          </a:p>
+        </p:txBody>
+      </p:sp>
+      <p:sp>
+        <p:nvSpPr>
+          <p:cNvPr id="3" name="Content Placeholder 2">
+            <a:extLst>
+              <a:ext uri="{FF2B5EF4-FFF2-40B4-BE49-F238E27FC236}">
+                <a16:creationId xmlns:a16="http://schemas.microsoft.com/office/drawing/2014/main" id="{BD1F1B50-97F3-4784-88FE-6A4FC215ACCF}"/>
+              </a:ext>
+            </a:extLst>
+          </p:cNvPr>
+          <p:cNvSpPr>
+            <a:spLocks noGrp="1"/>
+          </p:cNvSpPr>
+          <p:nvPr>
+            <p:ph sz="half" idx="2"/>
+          </p:nvPr>
+        </p:nvSpPr>
+        <p:spPr>
+          <a:xfrm>
+            <a:off x="457200" y="1217891"/>
+            <a:ext cx="5588582" cy="3373229"/>
+          </a:xfrm>
+          <a:ln>
+            <a:noFill/>
+          </a:ln>
+        </p:spPr>
+        <p:txBody>
+          <a:bodyPr/>
+          <a:lstStyle/>
+          <a:p>
+            <a:pPr>
+              <a:spcBef>
+                <a:spcPts val="800"/>
+              </a:spcBef>
+            </a:pPr>
+            <a:r>
+              <a:rPr lang="en-US" dirty="0"/>
+              <a:t>Documentation</a:t>
+            </a:r>
+          </a:p>
+          <a:p>
+            <a:pPr>
+              <a:spcBef>
+                <a:spcPts val="800"/>
+              </a:spcBef>
+            </a:pPr>
+            <a:r>
+              <a:rPr lang="en-US" dirty="0"/>
+              <a:t>Licensing</a:t>
+            </a:r>
+          </a:p>
+          <a:p>
+            <a:pPr>
+              <a:spcBef>
+                <a:spcPts val="800"/>
+              </a:spcBef>
+            </a:pPr>
+            <a:r>
+              <a:rPr lang="en-US" dirty="0"/>
+              <a:t>Packaging and distribution</a:t>
+            </a:r>
+          </a:p>
+          <a:p>
+            <a:pPr>
+              <a:spcBef>
+                <a:spcPts val="800"/>
+              </a:spcBef>
+            </a:pPr>
+            <a:r>
+              <a:rPr lang="en-US" dirty="0"/>
+              <a:t>Issue tracking</a:t>
+            </a:r>
+          </a:p>
+          <a:p>
+            <a:pPr>
+              <a:spcBef>
+                <a:spcPts val="800"/>
+              </a:spcBef>
+            </a:pPr>
+            <a:r>
+              <a:rPr lang="en-US" dirty="0"/>
+              <a:t>Configuration and build</a:t>
+            </a:r>
+          </a:p>
+          <a:p>
+            <a:pPr>
+              <a:spcBef>
+                <a:spcPts val="800"/>
+              </a:spcBef>
+            </a:pPr>
+            <a:r>
+              <a:rPr lang="en-US" dirty="0"/>
+              <a:t>Debugging strategies</a:t>
+            </a:r>
+          </a:p>
+          <a:p>
+            <a:pPr>
+              <a:spcBef>
+                <a:spcPts val="800"/>
+              </a:spcBef>
+            </a:pPr>
+            <a:r>
+              <a:rPr lang="en-US" dirty="0"/>
+              <a:t>Building and sustaining communities around software</a:t>
+            </a:r>
+          </a:p>
+          <a:p>
+            <a:pPr>
+              <a:spcBef>
+                <a:spcPts val="800"/>
+              </a:spcBef>
+            </a:pPr>
+            <a:r>
+              <a:rPr lang="en-US" dirty="0"/>
+              <a:t>Software publication and citation</a:t>
+            </a:r>
+          </a:p>
+          <a:p>
+            <a:pPr>
+              <a:spcBef>
+                <a:spcPts val="800"/>
+              </a:spcBef>
+            </a:pPr>
+            <a:r>
+              <a:rPr lang="en-US" dirty="0"/>
+              <a:t>Requirements gathering</a:t>
+            </a:r>
+          </a:p>
+          <a:p>
+            <a:pPr>
+              <a:spcBef>
+                <a:spcPts val="800"/>
+              </a:spcBef>
+            </a:pPr>
+            <a:r>
+              <a:rPr lang="en-US" dirty="0"/>
+              <a:t>Understanding and debugging floating-point math</a:t>
+            </a:r>
+          </a:p>
+          <a:p>
+            <a:pPr>
+              <a:spcBef>
+                <a:spcPts val="800"/>
+              </a:spcBef>
+            </a:pPr>
+            <a:r>
+              <a:rPr lang="en-US" dirty="0"/>
+              <a:t>Performance and performance portability</a:t>
+            </a:r>
+          </a:p>
+          <a:p>
+            <a:r>
+              <a:rPr lang="en-US" dirty="0"/>
+              <a:t>Project management</a:t>
+            </a:r>
+          </a:p>
+        </p:txBody>
+      </p:sp>
+      <p:sp>
+        <p:nvSpPr>
+          <p:cNvPr id="7" name="Content Placeholder 6">
+            <a:extLst>
+              <a:ext uri="{FF2B5EF4-FFF2-40B4-BE49-F238E27FC236}">
+                <a16:creationId xmlns:a16="http://schemas.microsoft.com/office/drawing/2014/main" id="{F1C4C0C8-A19F-42A3-BF4E-B009E8F99501}"/>
+              </a:ext>
+            </a:extLst>
+          </p:cNvPr>
+          <p:cNvSpPr>
+            <a:spLocks noGrp="1"/>
+          </p:cNvSpPr>
+          <p:nvPr>
+            <p:ph sz="quarter" idx="4"/>
+          </p:nvPr>
+        </p:nvSpPr>
+        <p:spPr>
+          <a:xfrm>
+            <a:off x="6218914" y="1217891"/>
+            <a:ext cx="5531934" cy="3373229"/>
+          </a:xfrm>
+          <a:ln>
+            <a:noFill/>
+          </a:ln>
+        </p:spPr>
+        <p:txBody>
+          <a:bodyPr/>
+          <a:lstStyle/>
+          <a:p>
+            <a:r>
+              <a:rPr lang="en-US" dirty="0"/>
+              <a:t>Collaboration around software development</a:t>
+            </a:r>
+          </a:p>
+          <a:p>
+            <a:r>
+              <a:rPr lang="en-US" dirty="0"/>
+              <a:t>Designing software for flexibility and extensibility</a:t>
+            </a:r>
+          </a:p>
+          <a:p>
+            <a:r>
+              <a:rPr lang="en-US" dirty="0"/>
+              <a:t>Systematic refactoring of large, complex software systems</a:t>
+            </a:r>
+          </a:p>
+          <a:p>
+            <a:r>
+              <a:rPr lang="en-US" dirty="0"/>
+              <a:t>Reproducibility</a:t>
+            </a:r>
+            <a:endParaRPr lang="en-US" b="1" dirty="0">
+              <a:solidFill>
+                <a:schemeClr val="tx2"/>
+              </a:solidFill>
+            </a:endParaRPr>
+          </a:p>
+          <a:p>
+            <a:pPr>
+              <a:spcBef>
+                <a:spcPts val="2400"/>
+              </a:spcBef>
+            </a:pPr>
+            <a:r>
+              <a:rPr lang="en-US" b="1" dirty="0">
+                <a:solidFill>
+                  <a:schemeClr val="tx2"/>
+                </a:solidFill>
+              </a:rPr>
+              <a:t>Also important topics, but…</a:t>
+            </a:r>
+          </a:p>
+          <a:p>
+            <a:pPr>
+              <a:spcBef>
+                <a:spcPts val="800"/>
+              </a:spcBef>
+            </a:pPr>
+            <a:r>
+              <a:rPr lang="en-US" dirty="0">
+                <a:solidFill>
+                  <a:schemeClr val="tx2"/>
+                </a:solidFill>
+              </a:rPr>
+              <a:t>Less distinction between research software and other software</a:t>
+            </a:r>
+          </a:p>
+          <a:p>
+            <a:pPr>
+              <a:spcBef>
+                <a:spcPts val="800"/>
+              </a:spcBef>
+            </a:pPr>
+            <a:r>
+              <a:rPr lang="en-US" dirty="0">
+                <a:solidFill>
+                  <a:schemeClr val="tx2"/>
+                </a:solidFill>
+              </a:rPr>
+              <a:t>More informational resources available</a:t>
+            </a:r>
+          </a:p>
+          <a:p>
+            <a:pPr>
+              <a:spcBef>
+                <a:spcPts val="800"/>
+              </a:spcBef>
+            </a:pPr>
+            <a:r>
+              <a:rPr lang="en-US" dirty="0">
+                <a:solidFill>
+                  <a:schemeClr val="tx2"/>
+                </a:solidFill>
+              </a:rPr>
+              <a:t>Next-level concerns for starting researchers</a:t>
+            </a:r>
+          </a:p>
+          <a:p>
+            <a:pPr>
+              <a:spcBef>
+                <a:spcPts val="800"/>
+              </a:spcBef>
+            </a:pPr>
+            <a:r>
+              <a:rPr lang="en-US" dirty="0">
+                <a:solidFill>
+                  <a:schemeClr val="tx2"/>
+                </a:solidFill>
+              </a:rPr>
+              <a:t>Very limited time!</a:t>
+            </a:r>
+          </a:p>
+          <a:p>
+            <a:endParaRPr lang="en-US" dirty="0"/>
+          </a:p>
+        </p:txBody>
+      </p:sp>
+    </p:spTree>
+    <p:extLst>
+      <p:ext uri="{BB962C8B-B14F-4D97-AF65-F5344CB8AC3E}">
+        <p14:creationId xmlns:p14="http://schemas.microsoft.com/office/powerpoint/2010/main" val="4072028838"/>
+      </p:ext>
+    </p:extLst>
+  </p:cSld>
+  <p:clrMapOvr>
+    <a:masterClrMapping/>
+  </p:clrMapOvr>
+</p:sld>
+</file>
+
+<file path=ppt/slides/slide6.xml><?xml version="1.0" encoding="utf-8"?>
 <p:sld xmlns:a="http://schemas.openxmlformats.org/drawingml/2006/main" xmlns:r="http://schemas.openxmlformats.org/officeDocument/2006/relationships" xmlns:p="http://schemas.openxmlformats.org/presentationml/2006/main">
   <p:cSld>
     <p:spTree>
@@ -3839,7 +4799,7 @@
 </p:sld>
 </file>
 
-<file path=ppt/slides/slide11.xml><?xml version="1.0" encoding="utf-8"?>
+<file path=ppt/slides/slide7.xml><?xml version="1.0" encoding="utf-8"?>
 <p:sld xmlns:a="http://schemas.openxmlformats.org/drawingml/2006/main" xmlns:r="http://schemas.openxmlformats.org/officeDocument/2006/relationships" xmlns:p="http://schemas.openxmlformats.org/presentationml/2006/main">
   <p:cSld>
     <p:spTree>
@@ -4982,7 +5942,7 @@
 </p:sld>
 </file>
 
-<file path=ppt/slides/slide12.xml><?xml version="1.0" encoding="utf-8"?>
+<file path=ppt/slides/slide8.xml><?xml version="1.0" encoding="utf-8"?>
 <p:sld xmlns:a="http://schemas.openxmlformats.org/drawingml/2006/main" xmlns:r="http://schemas.openxmlformats.org/officeDocument/2006/relationships" xmlns:p="http://schemas.openxmlformats.org/presentationml/2006/main">
   <p:cSld>
     <p:spTree>
@@ -5053,39 +6013,6 @@
           <a:bodyPr/>
           <a:lstStyle/>
           <a:p>
-            <a:r>
-              <a:rPr lang="en-US" b="1" dirty="0">
-                <a:solidFill>
-                  <a:schemeClr val="tx2"/>
-                </a:solidFill>
-              </a:rPr>
-              <a:t>Please complete an evaluation of this tutorial</a:t>
-            </a:r>
-          </a:p>
-          <a:p>
-            <a:pPr lvl="1"/>
-            <a:r>
-              <a:rPr lang="en-US" u="sng" dirty="0">
-                <a:solidFill>
-                  <a:schemeClr val="tx2"/>
-                </a:solidFill>
-                <a:hlinkClick r:id="rId2">
-                  <a:extLst>
-                    <a:ext uri="{A12FA001-AC4F-418D-AE19-62706E023703}">
-                      <ahyp:hlinkClr xmlns:ahyp="http://schemas.microsoft.com/office/drawing/2018/hyperlinkcolor" val="tx"/>
-                    </a:ext>
-                  </a:extLst>
-                </a:hlinkClick>
-              </a:rPr>
-              <a:t>https://submissions.supercomputing.org/?page=Submit&amp;id=TutorialEvaluation&amp;site=sc20</a:t>
-            </a:r>
-            <a:endParaRPr lang="en-US" u="sng" dirty="0">
-              <a:solidFill>
-                <a:schemeClr val="tx2"/>
-              </a:solidFill>
-            </a:endParaRPr>
-          </a:p>
-          <a:p>
             <a:pPr>
               <a:spcBef>
                 <a:spcPts val="2400"/>
@@ -5097,7 +6024,7 @@
             </a:r>
             <a:r>
               <a:rPr lang="en-US" dirty="0">
-                <a:hlinkClick r:id="rId3"/>
+                <a:hlinkClick r:id="rId2"/>
               </a:rPr>
               <a:t>bssw-tutorial@lists.mcs.anl.gov</a:t>
             </a:r>
@@ -5111,17 +6038,6 @@
             </a:pPr>
             <a:r>
               <a:rPr lang="en-US" dirty="0"/>
-              <a:t>We’ll provide feedback on pull requests in the hands-on repository</a:t>
-            </a:r>
-          </a:p>
-          <a:p>
-            <a:pPr>
-              <a:spcBef>
-                <a:spcPts val="2400"/>
-              </a:spcBef>
-            </a:pPr>
-            <a:r>
-              <a:rPr lang="en-US" dirty="0"/>
               <a:t>Follow us:</a:t>
             </a:r>
           </a:p>
@@ -5137,47 +6053,61 @@
             <a:r>
               <a:rPr lang="en-US" dirty="0"/>
               <a:t>Website: </a:t>
+            </a:r>
+            <a:r>
+              <a:rPr lang="en-US" dirty="0">
+                <a:hlinkClick r:id="rId3"/>
+              </a:rPr>
+              <a:t>https://ideas-productivity.org/</a:t>
+            </a:r>
+            <a:endParaRPr lang="en-US" dirty="0"/>
+          </a:p>
+          <a:p>
+            <a:pPr lvl="2"/>
+            <a:r>
+              <a:rPr lang="en-US" dirty="0"/>
+              <a:t>Announcement list: </a:t>
             </a:r>
             <a:r>
               <a:rPr lang="en-US" dirty="0">
                 <a:hlinkClick r:id="rId4"/>
               </a:rPr>
-              <a:t>https://ideas-productivity.org/</a:t>
+              <a:t>http://eepurl.com/cQCyJ5</a:t>
             </a:r>
             <a:endParaRPr lang="en-US" dirty="0"/>
           </a:p>
           <a:p>
+            <a:pPr lvl="1"/>
+            <a:r>
+              <a:rPr lang="en-US" dirty="0"/>
+              <a:t>Better Scientific Software </a:t>
+            </a:r>
+          </a:p>
+          <a:p>
             <a:pPr lvl="2"/>
             <a:r>
               <a:rPr lang="en-US" dirty="0"/>
-              <a:t>Announcement list: </a:t>
+              <a:t>Resources: </a:t>
             </a:r>
             <a:r>
               <a:rPr lang="en-US" dirty="0">
                 <a:hlinkClick r:id="rId5"/>
               </a:rPr>
-              <a:t>http://eepurl.com/cQCyJ5</a:t>
+              <a:t>https://bssw.io/</a:t>
             </a:r>
             <a:endParaRPr lang="en-US" dirty="0"/>
           </a:p>
           <a:p>
-            <a:pPr lvl="1"/>
+            <a:pPr lvl="2"/>
             <a:r>
               <a:rPr lang="en-US" dirty="0"/>
-              <a:t>Better Scientific Software </a:t>
-            </a:r>
-          </a:p>
-          <a:p>
-            <a:pPr lvl="2"/>
-            <a:r>
-              <a:rPr lang="en-US" dirty="0"/>
-              <a:t>Resources: </a:t>
+              <a:t>Monthly digest: </a:t>
             </a:r>
             <a:r>
               <a:rPr lang="en-US" dirty="0">
                 <a:hlinkClick r:id="rId6"/>
               </a:rPr>
-              <a:t>https://bssw.io/</a:t>
+              <a:t>https://bssw.io/pages/receive-our-email-digest</a:t>
             </a:r>
             <a:endParaRPr lang="en-US" dirty="0"/>
           </a:p>
@@ -5185,88 +6115,15 @@
             <a:pPr lvl="2"/>
             <a:r>
               <a:rPr lang="en-US" dirty="0"/>
-              <a:t>Monthly digest: </a:t>
+              <a:t>RSS feed: </a:t>
             </a:r>
             <a:r>
               <a:rPr lang="en-US" dirty="0">
                 <a:hlinkClick r:id="rId7"/>
               </a:rPr>
-              <a:t>https://bssw.io/pages/receive-our-email-digest</a:t>
+              <a:t>https://bssw.io/items.rss</a:t>
             </a:r>
             <a:endParaRPr lang="en-US" dirty="0"/>
-          </a:p>
-          <a:p>
-            <a:pPr lvl="2"/>
-            <a:r>
-              <a:rPr lang="en-US" dirty="0"/>
-              <a:t>RSS feed: </a:t>
-            </a:r>
-            <a:r>
-              <a:rPr lang="en-US" dirty="0">
-                <a:hlinkClick r:id="rId8"/>
-              </a:rPr>
-              <a:t>https://bssw.io/items.rss</a:t>
-            </a:r>
-            <a:endParaRPr lang="en-US" dirty="0"/>
-          </a:p>
-        </p:txBody>
-      </p:sp>
-      <p:sp>
-        <p:nvSpPr>
-          <p:cNvPr id="4" name="Rectangle 3">
-            <a:extLst>
-              <a:ext uri="{FF2B5EF4-FFF2-40B4-BE49-F238E27FC236}">
-                <a16:creationId xmlns:a16="http://schemas.microsoft.com/office/drawing/2014/main" id="{C24EF888-692C-4C4D-A080-C4925EC142EE}"/>
-              </a:ext>
-            </a:extLst>
-          </p:cNvPr>
-          <p:cNvSpPr/>
-          <p:nvPr/>
-        </p:nvSpPr>
-        <p:spPr>
-          <a:xfrm>
-            <a:off x="365760" y="1210792"/>
-            <a:ext cx="10922350" cy="980616"/>
-          </a:xfrm>
-          <a:prstGeom prst="rect">
-            <a:avLst/>
-          </a:prstGeom>
-          <a:noFill/>
-          <a:ln w="57150">
-            <a:solidFill>
-              <a:schemeClr val="tx2"/>
-            </a:solidFill>
-          </a:ln>
-          <a:effectLst>
-            <a:outerShdw blurRad="44450" dist="27940" dir="5400000" algn="ctr">
-              <a:srgbClr val="000000">
-                <a:alpha val="32000"/>
-              </a:srgbClr>
-            </a:outerShdw>
-          </a:effectLst>
-        </p:spPr>
-        <p:txBody>
-          <a:bodyPr rot="0" spcFirstLastPara="0" vertOverflow="overflow" horzOverflow="overflow" vert="horz" wrap="square" lIns="121851" tIns="60925" rIns="121851" bIns="60925" numCol="1" spcCol="0" rtlCol="0" fromWordArt="0" anchor="ctr" anchorCtr="0" forceAA="0" compatLnSpc="1">
-            <a:prstTxWarp prst="textNoShape">
-              <a:avLst/>
-            </a:prstTxWarp>
-            <a:noAutofit/>
-          </a:bodyPr>
-          <a:lstStyle/>
-          <a:p>
-            <a:pPr algn="ctr">
-              <a:lnSpc>
-                <a:spcPct val="90000"/>
-              </a:lnSpc>
-            </a:pPr>
-            <a:endParaRPr lang="en-US" sz="2000" dirty="0">
-              <a:ln w="57150">
-                <a:solidFill>
-                  <a:schemeClr val="tx2"/>
-                </a:solidFill>
-              </a:ln>
-              <a:noFill/>
-            </a:endParaRPr>
           </a:p>
         </p:txBody>
       </p:sp>
@@ -5285,7 +6142,7 @@
           <p:nvPr/>
         </p:nvPicPr>
         <p:blipFill>
-          <a:blip r:embed="rId9" cstate="print">
+          <a:blip r:embed="rId8" cstate="print">
             <a:extLst>
               <a:ext uri="{28A0092B-C50C-407E-A947-70E740481C1C}">
                 <a14:useLocalDpi xmlns:a14="http://schemas.microsoft.com/office/drawing/2010/main" val="0"/>
@@ -5310,2352 +6167,6 @@
     <p:extLst>
       <p:ext uri="{BB962C8B-B14F-4D97-AF65-F5344CB8AC3E}">
         <p14:creationId xmlns:p14="http://schemas.microsoft.com/office/powerpoint/2010/main" val="254769955"/>
-      </p:ext>
-    </p:extLst>
-  </p:cSld>
-  <p:clrMapOvr>
-    <a:masterClrMapping/>
-  </p:clrMapOvr>
-</p:sld>
-</file>
-
-<file path=ppt/slides/slide2.xml><?xml version="1.0" encoding="utf-8"?>
-<p:sld xmlns:a="http://schemas.openxmlformats.org/drawingml/2006/main" xmlns:r="http://schemas.openxmlformats.org/officeDocument/2006/relationships" xmlns:p="http://schemas.openxmlformats.org/presentationml/2006/main">
-  <p:cSld>
-    <p:spTree>
-      <p:nvGrpSpPr>
-        <p:cNvPr id="1" name=""/>
-        <p:cNvGrpSpPr/>
-        <p:nvPr/>
-      </p:nvGrpSpPr>
-      <p:grpSpPr>
-        <a:xfrm>
-          <a:off x="0" y="0"/>
-          <a:ext cx="0" cy="0"/>
-          <a:chOff x="0" y="0"/>
-          <a:chExt cx="0" cy="0"/>
-        </a:xfrm>
-      </p:grpSpPr>
-      <p:sp>
-        <p:nvSpPr>
-          <p:cNvPr id="2" name="Title 1">
-            <a:extLst>
-              <a:ext uri="{FF2B5EF4-FFF2-40B4-BE49-F238E27FC236}">
-                <a16:creationId xmlns:a16="http://schemas.microsoft.com/office/drawing/2014/main" id="{6442C24D-D970-4D40-8F14-D70C10A96304}"/>
-              </a:ext>
-            </a:extLst>
-          </p:cNvPr>
-          <p:cNvSpPr>
-            <a:spLocks noGrp="1"/>
-          </p:cNvSpPr>
-          <p:nvPr>
-            <p:ph type="title"/>
-          </p:nvPr>
-        </p:nvSpPr>
-        <p:spPr>
-          <a:xfrm>
-            <a:off x="363096" y="112911"/>
-            <a:ext cx="11372473" cy="914400"/>
-          </a:xfrm>
-        </p:spPr>
-        <p:txBody>
-          <a:bodyPr/>
-          <a:lstStyle/>
-          <a:p>
-            <a:r>
-              <a:rPr lang="en-US" dirty="0"/>
-              <a:t>License, Citation and Acknowledgements</a:t>
-            </a:r>
-          </a:p>
-        </p:txBody>
-      </p:sp>
-      <p:sp>
-        <p:nvSpPr>
-          <p:cNvPr id="3" name="Content Placeholder 2">
-            <a:extLst>
-              <a:ext uri="{FF2B5EF4-FFF2-40B4-BE49-F238E27FC236}">
-                <a16:creationId xmlns:a16="http://schemas.microsoft.com/office/drawing/2014/main" id="{0385A3AB-B258-4D59-B407-F7D57545A163}"/>
-              </a:ext>
-            </a:extLst>
-          </p:cNvPr>
-          <p:cNvSpPr>
-            <a:spLocks noGrp="1"/>
-          </p:cNvSpPr>
-          <p:nvPr>
-            <p:ph idx="1"/>
-          </p:nvPr>
-        </p:nvSpPr>
-        <p:spPr>
-          <a:xfrm>
-            <a:off x="409507" y="570111"/>
-            <a:ext cx="11369809" cy="4047778"/>
-          </a:xfrm>
-        </p:spPr>
-        <p:txBody>
-          <a:bodyPr/>
-          <a:lstStyle/>
-          <a:p>
-            <a:pPr marL="0" indent="0">
-              <a:buNone/>
-            </a:pPr>
-            <a:r>
-              <a:rPr lang="en-US" sz="2000" b="1" dirty="0"/>
-              <a:t>License and Citation</a:t>
-            </a:r>
-          </a:p>
-          <a:p>
-            <a:pPr>
-              <a:spcBef>
-                <a:spcPts val="400"/>
-              </a:spcBef>
-            </a:pPr>
-            <a:r>
-              <a:rPr lang="en-US" sz="1600" dirty="0"/>
-              <a:t>This work is licensed under a </a:t>
-            </a:r>
-            <a:r>
-              <a:rPr lang="en-US" sz="1600" dirty="0">
-                <a:hlinkClick r:id="rId2"/>
-              </a:rPr>
-              <a:t>Creative</a:t>
-            </a:r>
-            <a:r>
-              <a:rPr lang="en-US" sz="1600" dirty="0">
-                <a:hlinkClick r:id="rId3"/>
-              </a:rPr>
-              <a:t> Commons Attribution 4.0 International License</a:t>
-            </a:r>
-            <a:r>
-              <a:rPr lang="en-US" sz="1600" dirty="0"/>
-              <a:t> (CC BY 4.0).</a:t>
-            </a:r>
-          </a:p>
-          <a:p>
-            <a:pPr>
-              <a:spcBef>
-                <a:spcPts val="400"/>
-              </a:spcBef>
-            </a:pPr>
-            <a:r>
-              <a:rPr lang="en-US" sz="1600" b="1" dirty="0"/>
-              <a:t>The requested citation the overall tutorial is: David E. Bernholdt, Anshu Dubey, Patricia A. Grubel, Rinku K. Gupta, Better Scientific Software tutorial, in SC ‘20: International Conference for High Performance Computing, Networking, Storage and Analysis, online, 2020. DOI: </a:t>
-            </a:r>
-            <a:r>
-              <a:rPr lang="en-US" sz="1600" b="1" dirty="0">
-                <a:hlinkClick r:id="rId4"/>
-              </a:rPr>
-              <a:t>10.6084/m9.figshare.12994376</a:t>
-            </a:r>
-            <a:endParaRPr lang="en-US" sz="1600" b="1" dirty="0"/>
-          </a:p>
-          <a:p>
-            <a:pPr>
-              <a:spcBef>
-                <a:spcPts val="400"/>
-              </a:spcBef>
-            </a:pPr>
-            <a:r>
-              <a:rPr lang="en-US" sz="1600" dirty="0"/>
-              <a:t>Individual modules may be cited as </a:t>
-            </a:r>
-            <a:r>
-              <a:rPr lang="en-US" sz="1600" i="1" dirty="0"/>
-              <a:t>Speaker, Module Title</a:t>
-            </a:r>
-            <a:r>
-              <a:rPr lang="en-US" sz="1600" dirty="0"/>
-              <a:t>, in Better Scientific Software tutorial…</a:t>
-            </a:r>
-          </a:p>
-          <a:p>
-            <a:pPr marL="0" indent="0">
-              <a:spcBef>
-                <a:spcPts val="800"/>
-              </a:spcBef>
-              <a:buNone/>
-            </a:pPr>
-            <a:r>
-              <a:rPr lang="en-US" sz="2000" b="1" dirty="0"/>
-              <a:t>Acknowledgements</a:t>
-            </a:r>
-          </a:p>
-          <a:p>
-            <a:pPr>
-              <a:spcBef>
-                <a:spcPts val="400"/>
-              </a:spcBef>
-            </a:pPr>
-            <a:r>
-              <a:rPr lang="en-US" sz="1400" dirty="0"/>
-              <a:t>Additional contributors include: Mike </a:t>
-            </a:r>
-            <a:r>
-              <a:rPr lang="en-US" sz="1400" dirty="0" err="1"/>
-              <a:t>Heroux</a:t>
-            </a:r>
-            <a:r>
-              <a:rPr lang="en-US" sz="1400" dirty="0"/>
-              <a:t>, Alicia </a:t>
-            </a:r>
-            <a:r>
-              <a:rPr lang="en-US" sz="1400" dirty="0" err="1"/>
-              <a:t>Klinvex</a:t>
-            </a:r>
-            <a:r>
-              <a:rPr lang="en-US" sz="1400" dirty="0"/>
-              <a:t>, Mark Miller, Jared O’Neal, Katherine Riley, David Rogers, Deborah Stevens, James </a:t>
-            </a:r>
-            <a:r>
-              <a:rPr lang="en-US" sz="1400" dirty="0" err="1"/>
-              <a:t>Willenbring</a:t>
-            </a:r>
-            <a:endParaRPr lang="en-US" sz="1400" dirty="0"/>
-          </a:p>
-          <a:p>
-            <a:pPr>
-              <a:spcBef>
-                <a:spcPts val="400"/>
-              </a:spcBef>
-            </a:pPr>
-            <a:r>
-              <a:rPr lang="en-US" sz="1400" dirty="0"/>
-              <a:t>This work was supported by the U.S. Department of Energy Office of Science, Office of Advanced Scientific Computing Research (ASCR), and by the </a:t>
-            </a:r>
-            <a:r>
-              <a:rPr lang="en-US" sz="1400" dirty="0" err="1"/>
-              <a:t>Exascale</a:t>
-            </a:r>
-            <a:r>
-              <a:rPr lang="en-US" sz="1400" dirty="0"/>
-              <a:t> Computing Project (17-SC-20-SC), a collaborative effort of the U.S. Department of Energy Office of Science and the National Nuclear Security Administration</a:t>
-            </a:r>
-            <a:r>
-              <a:rPr lang="en-US" sz="1400" i="1" dirty="0"/>
-              <a:t>.</a:t>
-            </a:r>
-            <a:endParaRPr lang="en-US" sz="1400" dirty="0"/>
-          </a:p>
-          <a:p>
-            <a:pPr>
-              <a:spcBef>
-                <a:spcPts val="400"/>
-              </a:spcBef>
-            </a:pPr>
-            <a:r>
-              <a:rPr lang="en-US" sz="1400" dirty="0"/>
-              <a:t>This work was performed in part at the Argonne National Laboratory, which is managed by </a:t>
-            </a:r>
-            <a:r>
-              <a:rPr lang="en-US" sz="1400" dirty="0" err="1"/>
-              <a:t>UChicago</a:t>
-            </a:r>
-            <a:r>
-              <a:rPr lang="en-US" sz="1400" dirty="0"/>
-              <a:t> Argonne, LLC for the U.S. Department of Energy under Contract No. DE-AC02-06CH11357.</a:t>
-            </a:r>
-          </a:p>
-          <a:p>
-            <a:pPr>
-              <a:spcBef>
-                <a:spcPts val="400"/>
-              </a:spcBef>
-            </a:pPr>
-            <a:r>
-              <a:rPr lang="en-US" sz="1400" dirty="0"/>
-              <a:t>This work was performed in part at the Oak Ridge National Laboratory, which is managed by UT-Battelle, LLC for the U.S. Department of Energy under Contract No. DE-AC05-00OR22725.</a:t>
-            </a:r>
-          </a:p>
-          <a:p>
-            <a:pPr>
-              <a:spcBef>
-                <a:spcPts val="400"/>
-              </a:spcBef>
-            </a:pPr>
-            <a:r>
-              <a:rPr lang="en-US" sz="1400" dirty="0"/>
-              <a:t>This work was performed in part at the Lawrence Livermore National Laboratory, which is managed by Lawrence Livermore National Security, LLC for the U.S. Department of Energy under Contract No. DE-AC52-07NA27344.</a:t>
-            </a:r>
-          </a:p>
-          <a:p>
-            <a:pPr>
-              <a:spcBef>
-                <a:spcPts val="400"/>
-              </a:spcBef>
-            </a:pPr>
-            <a:r>
-              <a:rPr lang="en-US" sz="1400" dirty="0"/>
-              <a:t>This work was performed in part at the Los Alamos National Laboratory, which is managed by Triad National Security, LLC for the U.S. Department of Energy under Contract No.89233218CNA000001</a:t>
-            </a:r>
-          </a:p>
-          <a:p>
-            <a:pPr>
-              <a:spcBef>
-                <a:spcPts val="400"/>
-              </a:spcBef>
-            </a:pPr>
-            <a:r>
-              <a:rPr lang="en-US" sz="1400" dirty="0"/>
-              <a:t>This work was performed in part at Sandia National Laboratories. Sandia National Laboratories is a multi-mission laboratory managed and operated by National Technology and Engineering Solutions of Sandia, LLC., a wholly owned subsidiary of Honeywell International, Inc., for the U.S. Department of Energy’s National Nuclear Security Administration under contract DE-NA0003525.</a:t>
-            </a:r>
-          </a:p>
-        </p:txBody>
-      </p:sp>
-      <p:pic>
-        <p:nvPicPr>
-          <p:cNvPr id="4" name="Picture 2" descr="https://licensebuttons.net/l/by/4.0/88x31.png">
-            <a:extLst>
-              <a:ext uri="{FF2B5EF4-FFF2-40B4-BE49-F238E27FC236}">
-                <a16:creationId xmlns:a16="http://schemas.microsoft.com/office/drawing/2014/main" id="{61840015-22A0-4634-A2DE-AA05F998FD3A}"/>
-              </a:ext>
-            </a:extLst>
-          </p:cNvPr>
-          <p:cNvPicPr>
-            <a:picLocks noChangeAspect="1" noChangeArrowheads="1"/>
-          </p:cNvPicPr>
-          <p:nvPr/>
-        </p:nvPicPr>
-        <p:blipFill>
-          <a:blip r:embed="rId5">
-            <a:extLst>
-              <a:ext uri="{28A0092B-C50C-407E-A947-70E740481C1C}">
-                <a14:useLocalDpi xmlns:a14="http://schemas.microsoft.com/office/drawing/2010/main" val="0"/>
-              </a:ext>
-            </a:extLst>
-          </a:blip>
-          <a:srcRect/>
-          <a:stretch>
-            <a:fillRect/>
-          </a:stretch>
-        </p:blipFill>
-        <p:spPr bwMode="auto">
-          <a:xfrm>
-            <a:off x="10249254" y="570111"/>
-            <a:ext cx="1661258" cy="585216"/>
-          </a:xfrm>
-          <a:prstGeom prst="rect">
-            <a:avLst/>
-          </a:prstGeom>
-          <a:noFill/>
-          <a:extLst>
-            <a:ext uri="{909E8E84-426E-40DD-AFC4-6F175D3DCCD1}">
-              <a14:hiddenFill xmlns:a14="http://schemas.microsoft.com/office/drawing/2010/main">
-                <a:solidFill>
-                  <a:srgbClr val="FFFFFF"/>
-                </a:solidFill>
-              </a14:hiddenFill>
-            </a:ext>
-          </a:extLst>
-        </p:spPr>
-      </p:pic>
-    </p:spTree>
-    <p:extLst>
-      <p:ext uri="{BB962C8B-B14F-4D97-AF65-F5344CB8AC3E}">
-        <p14:creationId xmlns:p14="http://schemas.microsoft.com/office/powerpoint/2010/main" val="978726433"/>
-      </p:ext>
-    </p:extLst>
-  </p:cSld>
-  <p:clrMapOvr>
-    <a:masterClrMapping/>
-  </p:clrMapOvr>
-</p:sld>
-</file>
-
-<file path=ppt/slides/slide3.xml><?xml version="1.0" encoding="utf-8"?>
-<p:sld xmlns:a="http://schemas.openxmlformats.org/drawingml/2006/main" xmlns:r="http://schemas.openxmlformats.org/officeDocument/2006/relationships" xmlns:p="http://schemas.openxmlformats.org/presentationml/2006/main">
-  <p:cSld>
-    <p:spTree>
-      <p:nvGrpSpPr>
-        <p:cNvPr id="1" name=""/>
-        <p:cNvGrpSpPr/>
-        <p:nvPr/>
-      </p:nvGrpSpPr>
-      <p:grpSpPr>
-        <a:xfrm>
-          <a:off x="0" y="0"/>
-          <a:ext cx="0" cy="0"/>
-          <a:chOff x="0" y="0"/>
-          <a:chExt cx="0" cy="0"/>
-        </a:xfrm>
-      </p:grpSpPr>
-      <p:sp>
-        <p:nvSpPr>
-          <p:cNvPr id="2" name="Title 1">
-            <a:extLst>
-              <a:ext uri="{FF2B5EF4-FFF2-40B4-BE49-F238E27FC236}">
-                <a16:creationId xmlns:a16="http://schemas.microsoft.com/office/drawing/2014/main" id="{91244D94-3E9F-43CD-AAF7-1C9718E6D132}"/>
-              </a:ext>
-            </a:extLst>
-          </p:cNvPr>
-          <p:cNvSpPr>
-            <a:spLocks noGrp="1"/>
-          </p:cNvSpPr>
-          <p:nvPr>
-            <p:ph type="title"/>
-          </p:nvPr>
-        </p:nvSpPr>
-        <p:spPr/>
-        <p:txBody>
-          <a:bodyPr/>
-          <a:lstStyle/>
-          <a:p>
-            <a:r>
-              <a:rPr lang="en-US" dirty="0"/>
-              <a:t>Software Under the Microscope</a:t>
-            </a:r>
-          </a:p>
-        </p:txBody>
-      </p:sp>
-      <p:sp>
-        <p:nvSpPr>
-          <p:cNvPr id="3" name="Content Placeholder 2">
-            <a:extLst>
-              <a:ext uri="{FF2B5EF4-FFF2-40B4-BE49-F238E27FC236}">
-                <a16:creationId xmlns:a16="http://schemas.microsoft.com/office/drawing/2014/main" id="{268F46BB-6B5A-4644-9D89-549681D75630}"/>
-              </a:ext>
-            </a:extLst>
-          </p:cNvPr>
-          <p:cNvSpPr>
-            <a:spLocks noGrp="1"/>
-          </p:cNvSpPr>
-          <p:nvPr>
-            <p:ph sz="half" idx="2"/>
-          </p:nvPr>
-        </p:nvSpPr>
-        <p:spPr>
-          <a:xfrm>
-            <a:off x="457199" y="1419254"/>
-            <a:ext cx="5902349" cy="3373229"/>
-          </a:xfrm>
-          <a:ln>
-            <a:noFill/>
-          </a:ln>
-        </p:spPr>
-        <p:txBody>
-          <a:bodyPr/>
-          <a:lstStyle/>
-          <a:p>
-            <a:r>
-              <a:rPr lang="en-US" sz="2000" dirty="0"/>
-              <a:t>Mar. 16: Neil Ferguson (Imperial College) briefed UK Parliament on epidemiological modeling of COVID-19 pandemic</a:t>
-            </a:r>
-          </a:p>
-          <a:p>
-            <a:pPr lvl="1">
-              <a:spcBef>
-                <a:spcPts val="200"/>
-              </a:spcBef>
-            </a:pPr>
-            <a:r>
-              <a:rPr lang="en-US" sz="1600" dirty="0"/>
-              <a:t>Epidemiological models like this helped prompt government action, but have lots of assumptions</a:t>
-            </a:r>
-          </a:p>
-          <a:p>
-            <a:r>
-              <a:rPr lang="en-US" sz="2000" dirty="0"/>
-              <a:t>April 1: Nicholas Lewis (independent climate science researcher in UK) can’t easily see where some of the assumptions come from – publishes a blog article</a:t>
-            </a:r>
-          </a:p>
-          <a:p>
-            <a:pPr lvl="1"/>
-            <a:r>
-              <a:rPr lang="en-US" dirty="0">
-                <a:solidFill>
-                  <a:schemeClr val="tx2"/>
-                </a:solidFill>
-              </a:rPr>
-              <a:t>“Moreover, the computer code… is old, unverified, and documented inadequately, if at all…”</a:t>
-            </a:r>
-          </a:p>
-        </p:txBody>
-      </p:sp>
-      <p:pic>
-        <p:nvPicPr>
-          <p:cNvPr id="8" name="Picture 7" descr="A screenshot of a cell phone&#10;&#10;Description automatically generated">
-            <a:extLst>
-              <a:ext uri="{FF2B5EF4-FFF2-40B4-BE49-F238E27FC236}">
-                <a16:creationId xmlns:a16="http://schemas.microsoft.com/office/drawing/2014/main" id="{D75A5D10-6C61-4973-A536-F9DB2ECCEC95}"/>
-              </a:ext>
-            </a:extLst>
-          </p:cNvPr>
-          <p:cNvPicPr>
-            <a:picLocks noChangeAspect="1"/>
-          </p:cNvPicPr>
-          <p:nvPr/>
-        </p:nvPicPr>
-        <p:blipFill rotWithShape="1">
-          <a:blip r:embed="rId2" cstate="print">
-            <a:extLst>
-              <a:ext uri="{28A0092B-C50C-407E-A947-70E740481C1C}">
-                <a14:useLocalDpi xmlns:a14="http://schemas.microsoft.com/office/drawing/2010/main" val="0"/>
-              </a:ext>
-            </a:extLst>
-          </a:blip>
-          <a:srcRect l="9115" t="9104" r="7533" b="76091"/>
-          <a:stretch/>
-        </p:blipFill>
-        <p:spPr>
-          <a:xfrm>
-            <a:off x="6809849" y="4122497"/>
-            <a:ext cx="4042279" cy="1015300"/>
-          </a:xfrm>
-          <a:prstGeom prst="rect">
-            <a:avLst/>
-          </a:prstGeom>
-          <a:ln w="19050">
-            <a:gradFill flip="none" rotWithShape="1">
-              <a:gsLst>
-                <a:gs pos="0">
-                  <a:schemeClr val="accent1">
-                    <a:lumMod val="5000"/>
-                    <a:lumOff val="95000"/>
-                  </a:schemeClr>
-                </a:gs>
-                <a:gs pos="74000">
-                  <a:schemeClr val="accent1">
-                    <a:lumMod val="45000"/>
-                    <a:lumOff val="55000"/>
-                  </a:schemeClr>
-                </a:gs>
-                <a:gs pos="83000">
-                  <a:schemeClr val="accent1">
-                    <a:lumMod val="45000"/>
-                    <a:lumOff val="55000"/>
-                  </a:schemeClr>
-                </a:gs>
-                <a:gs pos="100000">
-                  <a:schemeClr val="accent1">
-                    <a:lumMod val="30000"/>
-                    <a:lumOff val="70000"/>
-                  </a:schemeClr>
-                </a:gs>
-              </a:gsLst>
-              <a:lin ang="16200000" scaled="1"/>
-              <a:tileRect/>
-            </a:gradFill>
-          </a:ln>
-        </p:spPr>
-      </p:pic>
-      <p:pic>
-        <p:nvPicPr>
-          <p:cNvPr id="10" name="Picture 9" descr="A screenshot of a cell phone&#10;&#10;Description automatically generated">
-            <a:extLst>
-              <a:ext uri="{FF2B5EF4-FFF2-40B4-BE49-F238E27FC236}">
-                <a16:creationId xmlns:a16="http://schemas.microsoft.com/office/drawing/2014/main" id="{0478805F-E121-4A80-88F5-B4CDA20812BF}"/>
-              </a:ext>
-            </a:extLst>
-          </p:cNvPr>
-          <p:cNvPicPr>
-            <a:picLocks noChangeAspect="1"/>
-          </p:cNvPicPr>
-          <p:nvPr/>
-        </p:nvPicPr>
-        <p:blipFill rotWithShape="1">
-          <a:blip r:embed="rId3" cstate="print">
-            <a:extLst>
-              <a:ext uri="{28A0092B-C50C-407E-A947-70E740481C1C}">
-                <a14:useLocalDpi xmlns:a14="http://schemas.microsoft.com/office/drawing/2010/main" val="0"/>
-              </a:ext>
-            </a:extLst>
-          </a:blip>
-          <a:srcRect l="10675" t="3862" r="9742" b="62942"/>
-          <a:stretch/>
-        </p:blipFill>
-        <p:spPr>
-          <a:xfrm>
-            <a:off x="6143044" y="339860"/>
-            <a:ext cx="3859399" cy="2276542"/>
-          </a:xfrm>
-          <a:prstGeom prst="rect">
-            <a:avLst/>
-          </a:prstGeom>
-          <a:ln w="19050">
-            <a:gradFill flip="none" rotWithShape="1">
-              <a:gsLst>
-                <a:gs pos="0">
-                  <a:schemeClr val="accent1">
-                    <a:lumMod val="5000"/>
-                    <a:lumOff val="95000"/>
-                  </a:schemeClr>
-                </a:gs>
-                <a:gs pos="74000">
-                  <a:schemeClr val="accent1">
-                    <a:lumMod val="45000"/>
-                    <a:lumOff val="55000"/>
-                  </a:schemeClr>
-                </a:gs>
-                <a:gs pos="83000">
-                  <a:schemeClr val="accent1">
-                    <a:lumMod val="45000"/>
-                    <a:lumOff val="55000"/>
-                  </a:schemeClr>
-                </a:gs>
-                <a:gs pos="100000">
-                  <a:schemeClr val="accent1">
-                    <a:lumMod val="30000"/>
-                    <a:lumOff val="70000"/>
-                  </a:schemeClr>
-                </a:gs>
-              </a:gsLst>
-              <a:lin ang="16200000" scaled="1"/>
-              <a:tileRect/>
-            </a:gradFill>
-          </a:ln>
-        </p:spPr>
-      </p:pic>
-      <p:pic>
-        <p:nvPicPr>
-          <p:cNvPr id="12" name="Picture 11" descr="A close up of a map&#10;&#10;Description automatically generated">
-            <a:extLst>
-              <a:ext uri="{FF2B5EF4-FFF2-40B4-BE49-F238E27FC236}">
-                <a16:creationId xmlns:a16="http://schemas.microsoft.com/office/drawing/2014/main" id="{07733F80-77F2-46CC-8074-06717545457E}"/>
-              </a:ext>
-            </a:extLst>
-          </p:cNvPr>
-          <p:cNvPicPr>
-            <a:picLocks noChangeAspect="1"/>
-          </p:cNvPicPr>
-          <p:nvPr/>
-        </p:nvPicPr>
-        <p:blipFill rotWithShape="1">
-          <a:blip r:embed="rId4" cstate="print">
-            <a:extLst>
-              <a:ext uri="{28A0092B-C50C-407E-A947-70E740481C1C}">
-                <a14:useLocalDpi xmlns:a14="http://schemas.microsoft.com/office/drawing/2010/main" val="0"/>
-              </a:ext>
-            </a:extLst>
-          </a:blip>
-          <a:srcRect l="11326" t="15632" r="10913" b="44828"/>
-          <a:stretch/>
-        </p:blipFill>
-        <p:spPr>
-          <a:xfrm>
-            <a:off x="8288767" y="1176619"/>
-            <a:ext cx="3771112" cy="2711670"/>
-          </a:xfrm>
-          <a:prstGeom prst="rect">
-            <a:avLst/>
-          </a:prstGeom>
-          <a:ln>
-            <a:solidFill>
-              <a:schemeClr val="accent1"/>
-            </a:solidFill>
-          </a:ln>
-          <a:effectLst>
-            <a:outerShdw blurRad="50800" dist="38100" dir="2700000" algn="tl" rotWithShape="0">
-              <a:prstClr val="black">
-                <a:alpha val="40000"/>
-              </a:prstClr>
-            </a:outerShdw>
-          </a:effectLst>
-        </p:spPr>
-      </p:pic>
-      <p:sp>
-        <p:nvSpPr>
-          <p:cNvPr id="13" name="TextBox 12">
-            <a:extLst>
-              <a:ext uri="{FF2B5EF4-FFF2-40B4-BE49-F238E27FC236}">
-                <a16:creationId xmlns:a16="http://schemas.microsoft.com/office/drawing/2014/main" id="{95476604-38E0-4990-8608-A0AF27FDA5F7}"/>
-              </a:ext>
-            </a:extLst>
-          </p:cNvPr>
-          <p:cNvSpPr txBox="1"/>
-          <p:nvPr/>
-        </p:nvSpPr>
-        <p:spPr>
-          <a:xfrm>
-            <a:off x="457200" y="5353371"/>
-            <a:ext cx="7390806" cy="766364"/>
-          </a:xfrm>
-          <a:prstGeom prst="rect">
-            <a:avLst/>
-          </a:prstGeom>
-        </p:spPr>
-        <p:style>
-          <a:lnRef idx="2">
-            <a:schemeClr val="dk1"/>
-          </a:lnRef>
-          <a:fillRef idx="1">
-            <a:schemeClr val="lt1"/>
-          </a:fillRef>
-          <a:effectRef idx="0">
-            <a:schemeClr val="dk1"/>
-          </a:effectRef>
-          <a:fontRef idx="minor">
-            <a:schemeClr val="dk1"/>
-          </a:fontRef>
-        </p:style>
-        <p:txBody>
-          <a:bodyPr wrap="none" lIns="118872" tIns="91440" rIns="118872" bIns="91440" rtlCol="0" anchor="ctr" anchorCtr="0">
-            <a:spAutoFit/>
-          </a:bodyPr>
-          <a:lstStyle/>
-          <a:p>
-            <a:pPr>
-              <a:lnSpc>
-                <a:spcPct val="90000"/>
-              </a:lnSpc>
-            </a:pPr>
-            <a:r>
-              <a:rPr lang="en-US" sz="1400" dirty="0">
-                <a:hlinkClick r:id="rId5"/>
-              </a:rPr>
-              <a:t>https://doi.org/10.25561/77482</a:t>
-            </a:r>
-            <a:endParaRPr lang="en-US" sz="1400" dirty="0">
-              <a:hlinkClick r:id="rId6"/>
-            </a:endParaRPr>
-          </a:p>
-          <a:p>
-            <a:pPr>
-              <a:lnSpc>
-                <a:spcPct val="90000"/>
-              </a:lnSpc>
-            </a:pPr>
-            <a:r>
-              <a:rPr lang="en-US" sz="1400" dirty="0">
-                <a:hlinkClick r:id="rId7"/>
-              </a:rPr>
-              <a:t>https://www.nicholaslewis.org/imperial-college-uk-covid-19-numbers-dont-seem-to-add-up/</a:t>
-            </a:r>
-            <a:endParaRPr lang="en-US" sz="1400" dirty="0"/>
-          </a:p>
-          <a:p>
-            <a:pPr>
-              <a:lnSpc>
-                <a:spcPct val="90000"/>
-              </a:lnSpc>
-            </a:pPr>
-            <a:r>
-              <a:rPr lang="en-US" sz="1400" dirty="0">
-                <a:hlinkClick r:id="rId6"/>
-              </a:rPr>
-              <a:t>https://www.nature.com/articles/d41586-020-01003-6</a:t>
-            </a:r>
-            <a:endParaRPr lang="en-US" sz="1400" dirty="0"/>
-          </a:p>
-        </p:txBody>
-      </p:sp>
-    </p:spTree>
-    <p:extLst>
-      <p:ext uri="{BB962C8B-B14F-4D97-AF65-F5344CB8AC3E}">
-        <p14:creationId xmlns:p14="http://schemas.microsoft.com/office/powerpoint/2010/main" val="3946097563"/>
-      </p:ext>
-    </p:extLst>
-  </p:cSld>
-  <p:clrMapOvr>
-    <a:masterClrMapping/>
-  </p:clrMapOvr>
-</p:sld>
-</file>
-
-<file path=ppt/slides/slide4.xml><?xml version="1.0" encoding="utf-8"?>
-<p:sld xmlns:a="http://schemas.openxmlformats.org/drawingml/2006/main" xmlns:r="http://schemas.openxmlformats.org/officeDocument/2006/relationships" xmlns:p="http://schemas.openxmlformats.org/presentationml/2006/main">
-  <p:cSld>
-    <p:spTree>
-      <p:nvGrpSpPr>
-        <p:cNvPr id="1" name=""/>
-        <p:cNvGrpSpPr/>
-        <p:nvPr/>
-      </p:nvGrpSpPr>
-      <p:grpSpPr>
-        <a:xfrm>
-          <a:off x="0" y="0"/>
-          <a:ext cx="0" cy="0"/>
-          <a:chOff x="0" y="0"/>
-          <a:chExt cx="0" cy="0"/>
-        </a:xfrm>
-      </p:grpSpPr>
-      <p:sp>
-        <p:nvSpPr>
-          <p:cNvPr id="2" name="Title 1">
-            <a:extLst>
-              <a:ext uri="{FF2B5EF4-FFF2-40B4-BE49-F238E27FC236}">
-                <a16:creationId xmlns:a16="http://schemas.microsoft.com/office/drawing/2014/main" id="{E0D26887-E839-4994-8D3F-B684EEE2158C}"/>
-              </a:ext>
-            </a:extLst>
-          </p:cNvPr>
-          <p:cNvSpPr>
-            <a:spLocks noGrp="1"/>
-          </p:cNvSpPr>
-          <p:nvPr>
-            <p:ph type="title"/>
-          </p:nvPr>
-        </p:nvSpPr>
-        <p:spPr/>
-        <p:txBody>
-          <a:bodyPr/>
-          <a:lstStyle/>
-          <a:p>
-            <a:r>
-              <a:rPr lang="en-US" dirty="0"/>
-              <a:t>The Press Picks Up the Story</a:t>
-            </a:r>
-          </a:p>
-        </p:txBody>
-      </p:sp>
-      <p:sp>
-        <p:nvSpPr>
-          <p:cNvPr id="7" name="TextBox 6">
-            <a:extLst>
-              <a:ext uri="{FF2B5EF4-FFF2-40B4-BE49-F238E27FC236}">
-                <a16:creationId xmlns:a16="http://schemas.microsoft.com/office/drawing/2014/main" id="{27B9885B-2F9D-4132-89B1-5734073BA3DA}"/>
-              </a:ext>
-            </a:extLst>
-          </p:cNvPr>
-          <p:cNvSpPr txBox="1"/>
-          <p:nvPr/>
-        </p:nvSpPr>
-        <p:spPr>
-          <a:xfrm>
-            <a:off x="1393927" y="5562257"/>
-            <a:ext cx="9400971" cy="572464"/>
-          </a:xfrm>
-          <a:prstGeom prst="rect">
-            <a:avLst/>
-          </a:prstGeom>
-        </p:spPr>
-        <p:style>
-          <a:lnRef idx="2">
-            <a:schemeClr val="dk1"/>
-          </a:lnRef>
-          <a:fillRef idx="1">
-            <a:schemeClr val="lt1"/>
-          </a:fillRef>
-          <a:effectRef idx="0">
-            <a:schemeClr val="dk1"/>
-          </a:effectRef>
-          <a:fontRef idx="minor">
-            <a:schemeClr val="dk1"/>
-          </a:fontRef>
-        </p:style>
-        <p:txBody>
-          <a:bodyPr wrap="none" lIns="118872" tIns="91440" rIns="118872" bIns="91440" rtlCol="0" anchor="ctr" anchorCtr="0">
-            <a:spAutoFit/>
-          </a:bodyPr>
-          <a:lstStyle/>
-          <a:p>
-            <a:pPr>
-              <a:lnSpc>
-                <a:spcPct val="90000"/>
-              </a:lnSpc>
-            </a:pPr>
-            <a:r>
-              <a:rPr lang="en-US" sz="1400" dirty="0">
-                <a:hlinkClick r:id="rId2"/>
-              </a:rPr>
-              <a:t>https://www.foxnews.com/world/imperial-college-britain-coronavirus-lockdown-buggy-mess-unreliable</a:t>
-            </a:r>
-            <a:endParaRPr lang="en-US" sz="1400" dirty="0"/>
-          </a:p>
-          <a:p>
-            <a:pPr>
-              <a:lnSpc>
-                <a:spcPct val="90000"/>
-              </a:lnSpc>
-            </a:pPr>
-            <a:r>
-              <a:rPr lang="en-US" sz="1400" dirty="0">
-                <a:hlinkClick r:id="rId3"/>
-              </a:rPr>
-              <a:t>https://www.telegraph.co.uk/technology/2020/05/16/coding-led-lockdown-totally-unreliable-buggy-mess-say-experts/</a:t>
-            </a:r>
-            <a:endParaRPr lang="en-US" sz="1400" dirty="0"/>
-          </a:p>
-        </p:txBody>
-      </p:sp>
-      <p:pic>
-        <p:nvPicPr>
-          <p:cNvPr id="12" name="Picture 11" descr="A screenshot of a social media post&#10;&#10;Description automatically generated">
-            <a:extLst>
-              <a:ext uri="{FF2B5EF4-FFF2-40B4-BE49-F238E27FC236}">
-                <a16:creationId xmlns:a16="http://schemas.microsoft.com/office/drawing/2014/main" id="{7A99D9B9-5B12-4D08-BDB7-1B5D6001092B}"/>
-              </a:ext>
-            </a:extLst>
-          </p:cNvPr>
-          <p:cNvPicPr>
-            <a:picLocks noChangeAspect="1"/>
-          </p:cNvPicPr>
-          <p:nvPr/>
-        </p:nvPicPr>
-        <p:blipFill rotWithShape="1">
-          <a:blip r:embed="rId4">
-            <a:extLst>
-              <a:ext uri="{28A0092B-C50C-407E-A947-70E740481C1C}">
-                <a14:useLocalDpi xmlns:a14="http://schemas.microsoft.com/office/drawing/2010/main" val="0"/>
-              </a:ext>
-            </a:extLst>
-          </a:blip>
-          <a:srcRect l="26511" t="41819" r="26898" b="37404"/>
-          <a:stretch/>
-        </p:blipFill>
-        <p:spPr>
-          <a:xfrm>
-            <a:off x="5837035" y="238701"/>
-            <a:ext cx="5678906" cy="1375038"/>
-          </a:xfrm>
-          <a:prstGeom prst="rect">
-            <a:avLst/>
-          </a:prstGeom>
-          <a:ln>
-            <a:solidFill>
-              <a:schemeClr val="accent1"/>
-            </a:solidFill>
-          </a:ln>
-          <a:effectLst>
-            <a:outerShdw blurRad="50800" dist="38100" dir="2700000" algn="tl" rotWithShape="0">
-              <a:prstClr val="black">
-                <a:alpha val="40000"/>
-              </a:prstClr>
-            </a:outerShdw>
-          </a:effectLst>
-        </p:spPr>
-      </p:pic>
-      <p:sp>
-        <p:nvSpPr>
-          <p:cNvPr id="13" name="Rectangle 12">
-            <a:extLst>
-              <a:ext uri="{FF2B5EF4-FFF2-40B4-BE49-F238E27FC236}">
-                <a16:creationId xmlns:a16="http://schemas.microsoft.com/office/drawing/2014/main" id="{9247790C-CFF1-484A-A92D-04A37887B341}"/>
-              </a:ext>
-            </a:extLst>
-          </p:cNvPr>
-          <p:cNvSpPr/>
-          <p:nvPr/>
-        </p:nvSpPr>
-        <p:spPr>
-          <a:xfrm>
-            <a:off x="186818" y="3349327"/>
-            <a:ext cx="5190403" cy="1754326"/>
-          </a:xfrm>
-          <a:prstGeom prst="rect">
-            <a:avLst/>
-          </a:prstGeom>
-          <a:solidFill>
-            <a:schemeClr val="bg1"/>
-          </a:solidFill>
-          <a:ln>
-            <a:solidFill>
-              <a:schemeClr val="accent1"/>
-            </a:solidFill>
-          </a:ln>
-          <a:effectLst>
-            <a:outerShdw blurRad="50800" dist="38100" dir="2700000" algn="tl" rotWithShape="0">
-              <a:prstClr val="black">
-                <a:alpha val="40000"/>
-              </a:prstClr>
-            </a:outerShdw>
-          </a:effectLst>
-        </p:spPr>
-        <p:txBody>
-          <a:bodyPr wrap="square">
-            <a:spAutoFit/>
-          </a:bodyPr>
-          <a:lstStyle/>
-          <a:p>
-            <a:r>
-              <a:rPr lang="en-US" dirty="0">
-                <a:latin typeface="+mn-lt"/>
-              </a:rPr>
-              <a:t>“</a:t>
-            </a:r>
-            <a:r>
-              <a:rPr lang="en-US" dirty="0">
-                <a:highlight>
-                  <a:srgbClr val="FFFF00"/>
-                </a:highlight>
-                <a:latin typeface="+mn-lt"/>
-              </a:rPr>
-              <a:t>Models must be capable of passing the basic scientific test of producing the same results given the same initial set of parameters</a:t>
-            </a:r>
-            <a:r>
-              <a:rPr lang="en-US" dirty="0">
-                <a:latin typeface="+mn-lt"/>
-              </a:rPr>
-              <a:t>…otherwise, there is simply no way of knowing whether they will be reliable,” said Michael Bonsall, Professor of Mathematical Biology at Oxford University.</a:t>
-            </a:r>
-          </a:p>
-        </p:txBody>
-      </p:sp>
-      <p:sp>
-        <p:nvSpPr>
-          <p:cNvPr id="14" name="Rectangle 13">
-            <a:extLst>
-              <a:ext uri="{FF2B5EF4-FFF2-40B4-BE49-F238E27FC236}">
-                <a16:creationId xmlns:a16="http://schemas.microsoft.com/office/drawing/2014/main" id="{590551D9-996E-4696-B3DD-86421718D866}"/>
-              </a:ext>
-            </a:extLst>
-          </p:cNvPr>
-          <p:cNvSpPr/>
-          <p:nvPr/>
-        </p:nvSpPr>
-        <p:spPr>
-          <a:xfrm>
-            <a:off x="373787" y="1425155"/>
-            <a:ext cx="4816467" cy="1754326"/>
-          </a:xfrm>
-          <a:prstGeom prst="rect">
-            <a:avLst/>
-          </a:prstGeom>
-          <a:solidFill>
-            <a:schemeClr val="bg1"/>
-          </a:solidFill>
-          <a:ln>
-            <a:solidFill>
-              <a:schemeClr val="accent1"/>
-            </a:solidFill>
-          </a:ln>
-          <a:effectLst>
-            <a:outerShdw blurRad="50800" dist="38100" dir="2700000" algn="tl" rotWithShape="0">
-              <a:prstClr val="black">
-                <a:alpha val="40000"/>
-              </a:prstClr>
-            </a:outerShdw>
-          </a:effectLst>
-        </p:spPr>
-        <p:txBody>
-          <a:bodyPr wrap="square">
-            <a:spAutoFit/>
-          </a:bodyPr>
-          <a:lstStyle/>
-          <a:p>
-            <a:r>
-              <a:rPr lang="en-US" dirty="0"/>
-              <a:t>“In our commercial reality, </a:t>
-            </a:r>
-            <a:r>
-              <a:rPr lang="en-US" dirty="0">
-                <a:highlight>
-                  <a:srgbClr val="FFFF00"/>
-                </a:highlight>
-              </a:rPr>
-              <a:t>we would fire anyone for developing code like this </a:t>
-            </a:r>
-            <a:r>
-              <a:rPr lang="en-US" dirty="0"/>
-              <a:t>and any business that relied on it to produce software for sale would likely go bust,” David Richards, co-founder of British data technology company </a:t>
-            </a:r>
-            <a:r>
-              <a:rPr lang="en-US" dirty="0" err="1"/>
-              <a:t>WANdisco</a:t>
-            </a:r>
-            <a:r>
-              <a:rPr lang="en-US" dirty="0"/>
-              <a:t>, told the Daily Telegraph.</a:t>
-            </a:r>
-          </a:p>
-        </p:txBody>
-      </p:sp>
-      <p:sp>
-        <p:nvSpPr>
-          <p:cNvPr id="15" name="Rectangle 14">
-            <a:extLst>
-              <a:ext uri="{FF2B5EF4-FFF2-40B4-BE49-F238E27FC236}">
-                <a16:creationId xmlns:a16="http://schemas.microsoft.com/office/drawing/2014/main" id="{A9681A77-8F7F-40BA-A04E-61141280FBC4}"/>
-              </a:ext>
-            </a:extLst>
-          </p:cNvPr>
-          <p:cNvSpPr/>
-          <p:nvPr/>
-        </p:nvSpPr>
-        <p:spPr>
-          <a:xfrm>
-            <a:off x="5625866" y="1879838"/>
-            <a:ext cx="6266248" cy="3416320"/>
-          </a:xfrm>
-          <a:prstGeom prst="rect">
-            <a:avLst/>
-          </a:prstGeom>
-          <a:solidFill>
-            <a:schemeClr val="bg1"/>
-          </a:solidFill>
-          <a:ln>
-            <a:solidFill>
-              <a:schemeClr val="accent1"/>
-            </a:solidFill>
-          </a:ln>
-          <a:effectLst>
-            <a:outerShdw blurRad="50800" dist="38100" dir="2700000" algn="tl" rotWithShape="0">
-              <a:prstClr val="black">
-                <a:alpha val="40000"/>
-              </a:prstClr>
-            </a:outerShdw>
-          </a:effectLst>
-        </p:spPr>
-        <p:txBody>
-          <a:bodyPr wrap="square">
-            <a:spAutoFit/>
-          </a:bodyPr>
-          <a:lstStyle/>
-          <a:p>
-            <a:r>
-              <a:rPr lang="en-US" dirty="0"/>
-              <a:t>Scientists from the University of Edinburgh have further claimed that it is </a:t>
-            </a:r>
-            <a:r>
-              <a:rPr lang="en-US" dirty="0">
-                <a:highlight>
-                  <a:srgbClr val="FFFF00"/>
-                </a:highlight>
-              </a:rPr>
-              <a:t>impossible to reproduce </a:t>
-            </a:r>
-            <a:r>
-              <a:rPr lang="en-US" dirty="0"/>
-              <a:t>the same results from the same data using the model. The team got different results when they used different machines, and even different results from the same machines.</a:t>
-            </a:r>
-          </a:p>
-          <a:p>
-            <a:r>
-              <a:rPr lang="en-US" dirty="0"/>
-              <a:t>“There appears to be a bug in either the creation or re-use of the network file. If we attempt two completely identical runs, only varying in that the second should use the network file produced by the first, the results are quite different,” the Edinburgh researchers wrote on the </a:t>
-            </a:r>
-            <a:r>
-              <a:rPr lang="en-US" dirty="0" err="1"/>
-              <a:t>Github</a:t>
-            </a:r>
-            <a:r>
-              <a:rPr lang="en-US" dirty="0"/>
-              <a:t> file.</a:t>
-            </a:r>
-          </a:p>
-          <a:p>
-            <a:r>
-              <a:rPr lang="en-US" dirty="0"/>
-              <a:t>A fix was provided, but it was </a:t>
-            </a:r>
-            <a:r>
-              <a:rPr lang="en-US" dirty="0">
-                <a:highlight>
-                  <a:srgbClr val="FFFF00"/>
-                </a:highlight>
-              </a:rPr>
-              <a:t>the first of many bugs </a:t>
-            </a:r>
-            <a:r>
-              <a:rPr lang="en-US" dirty="0"/>
-              <a:t>found within the program.</a:t>
-            </a:r>
-          </a:p>
-        </p:txBody>
-      </p:sp>
-      <p:sp>
-        <p:nvSpPr>
-          <p:cNvPr id="16" name="TextBox 15">
-            <a:extLst>
-              <a:ext uri="{FF2B5EF4-FFF2-40B4-BE49-F238E27FC236}">
-                <a16:creationId xmlns:a16="http://schemas.microsoft.com/office/drawing/2014/main" id="{2A6A05DB-8039-483A-8C18-6E63A758D369}"/>
-              </a:ext>
-            </a:extLst>
-          </p:cNvPr>
-          <p:cNvSpPr txBox="1"/>
-          <p:nvPr/>
-        </p:nvSpPr>
-        <p:spPr>
-          <a:xfrm>
-            <a:off x="373787" y="907768"/>
-            <a:ext cx="3430042" cy="350865"/>
-          </a:xfrm>
-          <a:prstGeom prst="rect">
-            <a:avLst/>
-          </a:prstGeom>
-          <a:noFill/>
-        </p:spPr>
-        <p:txBody>
-          <a:bodyPr wrap="none" lIns="118872" tIns="91440" rIns="118872" bIns="91440" rtlCol="0" anchor="ctr" anchorCtr="0">
-            <a:spAutoFit/>
-          </a:bodyPr>
-          <a:lstStyle/>
-          <a:p>
-            <a:pPr algn="l">
-              <a:lnSpc>
-                <a:spcPct val="90000"/>
-              </a:lnSpc>
-            </a:pPr>
-            <a:r>
-              <a:rPr lang="en-US" sz="1200" i="1" dirty="0">
-                <a:solidFill>
-                  <a:schemeClr val="tx2"/>
-                </a:solidFill>
-              </a:rPr>
-              <a:t>Headline and quotes from the Fox News article</a:t>
-            </a:r>
-          </a:p>
-        </p:txBody>
-      </p:sp>
-    </p:spTree>
-    <p:extLst>
-      <p:ext uri="{BB962C8B-B14F-4D97-AF65-F5344CB8AC3E}">
-        <p14:creationId xmlns:p14="http://schemas.microsoft.com/office/powerpoint/2010/main" val="3267181914"/>
-      </p:ext>
-    </p:extLst>
-  </p:cSld>
-  <p:clrMapOvr>
-    <a:masterClrMapping/>
-  </p:clrMapOvr>
-</p:sld>
-</file>
-
-<file path=ppt/slides/slide5.xml><?xml version="1.0" encoding="utf-8"?>
-<p:sld xmlns:a="http://schemas.openxmlformats.org/drawingml/2006/main" xmlns:r="http://schemas.openxmlformats.org/officeDocument/2006/relationships" xmlns:p="http://schemas.openxmlformats.org/presentationml/2006/main">
-  <p:cSld>
-    <p:spTree>
-      <p:nvGrpSpPr>
-        <p:cNvPr id="1" name=""/>
-        <p:cNvGrpSpPr/>
-        <p:nvPr/>
-      </p:nvGrpSpPr>
-      <p:grpSpPr>
-        <a:xfrm>
-          <a:off x="0" y="0"/>
-          <a:ext cx="0" cy="0"/>
-          <a:chOff x="0" y="0"/>
-          <a:chExt cx="0" cy="0"/>
-        </a:xfrm>
-      </p:grpSpPr>
-      <p:sp>
-        <p:nvSpPr>
-          <p:cNvPr id="2" name="Title 1">
-            <a:extLst>
-              <a:ext uri="{FF2B5EF4-FFF2-40B4-BE49-F238E27FC236}">
-                <a16:creationId xmlns:a16="http://schemas.microsoft.com/office/drawing/2014/main" id="{346BC4CB-2CF6-4B12-AA0F-B434DB9F521A}"/>
-              </a:ext>
-            </a:extLst>
-          </p:cNvPr>
-          <p:cNvSpPr>
-            <a:spLocks noGrp="1"/>
-          </p:cNvSpPr>
-          <p:nvPr>
-            <p:ph type="title"/>
-          </p:nvPr>
-        </p:nvSpPr>
-        <p:spPr/>
-        <p:txBody>
-          <a:bodyPr/>
-          <a:lstStyle/>
-          <a:p>
-            <a:r>
-              <a:rPr lang="en-US" dirty="0"/>
-              <a:t>What you May Not Have Heard</a:t>
-            </a:r>
-          </a:p>
-        </p:txBody>
-      </p:sp>
-      <p:sp>
-        <p:nvSpPr>
-          <p:cNvPr id="4" name="Content Placeholder 3">
-            <a:extLst>
-              <a:ext uri="{FF2B5EF4-FFF2-40B4-BE49-F238E27FC236}">
-                <a16:creationId xmlns:a16="http://schemas.microsoft.com/office/drawing/2014/main" id="{01357309-EA5B-4871-B245-254EA8DF9454}"/>
-              </a:ext>
-            </a:extLst>
-          </p:cNvPr>
-          <p:cNvSpPr>
-            <a:spLocks noGrp="1"/>
-          </p:cNvSpPr>
-          <p:nvPr>
-            <p:ph sz="half" idx="2"/>
-          </p:nvPr>
-        </p:nvSpPr>
-        <p:spPr>
-          <a:xfrm>
-            <a:off x="457200" y="1534144"/>
-            <a:ext cx="5588582" cy="3373229"/>
-          </a:xfrm>
-          <a:ln>
-            <a:noFill/>
-          </a:ln>
-        </p:spPr>
-        <p:txBody>
-          <a:bodyPr/>
-          <a:lstStyle/>
-          <a:p>
-            <a:r>
-              <a:rPr lang="en-US" dirty="0"/>
-              <a:t>April 22: Imperial collaborates with Microsoft to refactor and clean up the code, which is released on GitHub</a:t>
-            </a:r>
-          </a:p>
-          <a:p>
-            <a:r>
-              <a:rPr lang="en-US" dirty="0"/>
-              <a:t>May 10: Phil Bull rebuts criticisms of the Imperial code</a:t>
-            </a:r>
-          </a:p>
-          <a:p>
-            <a:pPr lvl="1"/>
-            <a:r>
-              <a:rPr lang="en-US" dirty="0"/>
-              <a:t>Which spurs further discussions within some groups focused on scientific software</a:t>
-            </a:r>
-          </a:p>
-          <a:p>
-            <a:r>
-              <a:rPr lang="en-US" dirty="0"/>
-              <a:t>May 29: CODECHECK independently reproduces results of Imperial’s Report 9</a:t>
-            </a:r>
-          </a:p>
-        </p:txBody>
-      </p:sp>
-      <p:sp>
-        <p:nvSpPr>
-          <p:cNvPr id="7" name="TextBox 6">
-            <a:extLst>
-              <a:ext uri="{FF2B5EF4-FFF2-40B4-BE49-F238E27FC236}">
-                <a16:creationId xmlns:a16="http://schemas.microsoft.com/office/drawing/2014/main" id="{15D30507-6194-454F-AB00-74011ECCE6EA}"/>
-              </a:ext>
-            </a:extLst>
-          </p:cNvPr>
-          <p:cNvSpPr txBox="1"/>
-          <p:nvPr/>
-        </p:nvSpPr>
-        <p:spPr>
-          <a:xfrm>
-            <a:off x="807902" y="5051400"/>
-            <a:ext cx="4809128" cy="1154162"/>
-          </a:xfrm>
-          <a:prstGeom prst="rect">
-            <a:avLst/>
-          </a:prstGeom>
-        </p:spPr>
-        <p:style>
-          <a:lnRef idx="2">
-            <a:schemeClr val="dk1"/>
-          </a:lnRef>
-          <a:fillRef idx="1">
-            <a:schemeClr val="lt1"/>
-          </a:fillRef>
-          <a:effectRef idx="0">
-            <a:schemeClr val="dk1"/>
-          </a:effectRef>
-          <a:fontRef idx="minor">
-            <a:schemeClr val="dk1"/>
-          </a:fontRef>
-        </p:style>
-        <p:txBody>
-          <a:bodyPr wrap="square" lIns="118872" tIns="91440" rIns="118872" bIns="91440" rtlCol="0" anchor="ctr" anchorCtr="0">
-            <a:spAutoFit/>
-          </a:bodyPr>
-          <a:lstStyle/>
-          <a:p>
-            <a:pPr>
-              <a:lnSpc>
-                <a:spcPct val="90000"/>
-              </a:lnSpc>
-            </a:pPr>
-            <a:r>
-              <a:rPr lang="en-US" sz="1400" dirty="0">
-                <a:hlinkClick r:id="rId2"/>
-              </a:rPr>
-              <a:t>https://github.com/mrc-ide/covid-sim/</a:t>
-            </a:r>
-            <a:endParaRPr lang="en-US" sz="1400" dirty="0"/>
-          </a:p>
-          <a:p>
-            <a:pPr>
-              <a:lnSpc>
-                <a:spcPct val="90000"/>
-              </a:lnSpc>
-            </a:pPr>
-            <a:r>
-              <a:rPr lang="en-US" sz="1400" dirty="0">
-                <a:hlinkClick r:id="rId3"/>
-              </a:rPr>
-              <a:t>https://philbull.wordpress.com/2020/05/10/why-you-can-ignore-reviews-of-scientific-code-by-commercial-software-developers/amp/</a:t>
-            </a:r>
-            <a:endParaRPr lang="en-US" sz="1400" dirty="0"/>
-          </a:p>
-          <a:p>
-            <a:pPr>
-              <a:lnSpc>
-                <a:spcPct val="90000"/>
-              </a:lnSpc>
-            </a:pPr>
-            <a:r>
-              <a:rPr lang="en-US" sz="1400" dirty="0">
-                <a:hlinkClick r:id="rId4"/>
-              </a:rPr>
-              <a:t>http://doi.org/10.5281/zenodo.3865491</a:t>
-            </a:r>
-            <a:endParaRPr lang="en-US" sz="1400" dirty="0"/>
-          </a:p>
-        </p:txBody>
-      </p:sp>
-      <p:sp>
-        <p:nvSpPr>
-          <p:cNvPr id="8" name="Rectangle 7">
-            <a:extLst>
-              <a:ext uri="{FF2B5EF4-FFF2-40B4-BE49-F238E27FC236}">
-                <a16:creationId xmlns:a16="http://schemas.microsoft.com/office/drawing/2014/main" id="{28B0AE1F-B199-489E-BB28-CE689B7DE1EE}"/>
-              </a:ext>
-            </a:extLst>
-          </p:cNvPr>
-          <p:cNvSpPr/>
-          <p:nvPr/>
-        </p:nvSpPr>
-        <p:spPr>
-          <a:xfrm>
-            <a:off x="6045782" y="1050899"/>
-            <a:ext cx="5975243" cy="2308324"/>
-          </a:xfrm>
-          <a:prstGeom prst="rect">
-            <a:avLst/>
-          </a:prstGeom>
-          <a:solidFill>
-            <a:schemeClr val="bg1"/>
-          </a:solidFill>
-          <a:ln>
-            <a:gradFill flip="none" rotWithShape="1">
-              <a:gsLst>
-                <a:gs pos="0">
-                  <a:schemeClr val="accent1">
-                    <a:lumMod val="5000"/>
-                    <a:lumOff val="95000"/>
-                  </a:schemeClr>
-                </a:gs>
-                <a:gs pos="74000">
-                  <a:schemeClr val="accent1">
-                    <a:lumMod val="45000"/>
-                    <a:lumOff val="55000"/>
-                  </a:schemeClr>
-                </a:gs>
-                <a:gs pos="83000">
-                  <a:schemeClr val="accent1">
-                    <a:lumMod val="45000"/>
-                    <a:lumOff val="55000"/>
-                  </a:schemeClr>
-                </a:gs>
-                <a:gs pos="100000">
-                  <a:schemeClr val="accent1">
-                    <a:lumMod val="30000"/>
-                    <a:lumOff val="70000"/>
-                  </a:schemeClr>
-                </a:gs>
-              </a:gsLst>
-              <a:lin ang="16200000" scaled="1"/>
-              <a:tileRect/>
-            </a:gradFill>
-          </a:ln>
-          <a:effectLst>
-            <a:outerShdw blurRad="50800" dist="38100" dir="2700000" algn="tl" rotWithShape="0">
-              <a:prstClr val="black">
-                <a:alpha val="40000"/>
-              </a:prstClr>
-            </a:outerShdw>
-          </a:effectLst>
-        </p:spPr>
-        <p:txBody>
-          <a:bodyPr wrap="square">
-            <a:spAutoFit/>
-          </a:bodyPr>
-          <a:lstStyle/>
-          <a:p>
-            <a:r>
-              <a:rPr lang="en-US" i="1" dirty="0" err="1">
-                <a:solidFill>
-                  <a:srgbClr val="353535"/>
-                </a:solidFill>
-                <a:latin typeface="+mn-lt"/>
-              </a:rPr>
-              <a:t>tl;dr</a:t>
-            </a:r>
-            <a:r>
-              <a:rPr lang="en-US" i="1" dirty="0">
-                <a:solidFill>
-                  <a:srgbClr val="353535"/>
-                </a:solidFill>
-                <a:latin typeface="+mn-lt"/>
-              </a:rPr>
-              <a:t>: Many </a:t>
-            </a:r>
-            <a:r>
-              <a:rPr lang="en-US" i="1" dirty="0">
-                <a:solidFill>
-                  <a:srgbClr val="353535"/>
-                </a:solidFill>
-                <a:highlight>
-                  <a:srgbClr val="FFFF00"/>
-                </a:highlight>
-                <a:latin typeface="+mn-lt"/>
-              </a:rPr>
-              <a:t>scientists write code that is crappy stylistically, but which is nevertheless scientifically correct </a:t>
-            </a:r>
-            <a:r>
-              <a:rPr lang="en-US" i="1" dirty="0">
-                <a:solidFill>
-                  <a:srgbClr val="353535"/>
-                </a:solidFill>
-                <a:latin typeface="+mn-lt"/>
-              </a:rPr>
-              <a:t>(following rigorous checking/validation of outputs </a:t>
-            </a:r>
-            <a:r>
-              <a:rPr lang="en-US" i="1" dirty="0" err="1">
-                <a:solidFill>
-                  <a:srgbClr val="353535"/>
-                </a:solidFill>
-                <a:latin typeface="+mn-lt"/>
-              </a:rPr>
-              <a:t>etc</a:t>
-            </a:r>
-            <a:r>
-              <a:rPr lang="en-US" i="1" dirty="0">
-                <a:solidFill>
-                  <a:srgbClr val="353535"/>
-                </a:solidFill>
-                <a:latin typeface="+mn-lt"/>
-              </a:rPr>
-              <a:t>). Professional </a:t>
-            </a:r>
-            <a:r>
-              <a:rPr lang="en-US" i="1" dirty="0">
-                <a:solidFill>
-                  <a:srgbClr val="353535"/>
-                </a:solidFill>
-                <a:highlight>
-                  <a:srgbClr val="FFFF00"/>
-                </a:highlight>
-                <a:latin typeface="+mn-lt"/>
-              </a:rPr>
-              <a:t>commercial software developers are well-qualified to review code style, but most don’t have a clue about checking scientific validity or what counts as good scientific practice</a:t>
-            </a:r>
-            <a:r>
-              <a:rPr lang="en-US" i="1" dirty="0">
-                <a:solidFill>
-                  <a:srgbClr val="353535"/>
-                </a:solidFill>
-                <a:latin typeface="+mn-lt"/>
-              </a:rPr>
-              <a:t>. Criticisms of the </a:t>
-            </a:r>
-            <a:r>
-              <a:rPr lang="en-US" i="1" dirty="0">
-                <a:latin typeface="+mn-lt"/>
-              </a:rPr>
-              <a:t>Imperial </a:t>
-            </a:r>
-            <a:r>
-              <a:rPr lang="en-US" i="1" dirty="0" err="1">
-                <a:latin typeface="+mn-lt"/>
-              </a:rPr>
-              <a:t>Covid</a:t>
-            </a:r>
-            <a:r>
-              <a:rPr lang="en-US" i="1" dirty="0">
-                <a:latin typeface="+mn-lt"/>
-              </a:rPr>
-              <a:t>-Sim </a:t>
-            </a:r>
-            <a:r>
-              <a:rPr lang="en-US" i="1" dirty="0">
-                <a:solidFill>
-                  <a:srgbClr val="353535"/>
-                </a:solidFill>
-                <a:latin typeface="+mn-lt"/>
-              </a:rPr>
-              <a:t>model from some of the latter are overstated at best.</a:t>
-            </a:r>
-            <a:endParaRPr lang="en-US" dirty="0">
-              <a:latin typeface="+mn-lt"/>
-            </a:endParaRPr>
-          </a:p>
-        </p:txBody>
-      </p:sp>
-      <p:pic>
-        <p:nvPicPr>
-          <p:cNvPr id="12" name="Picture 11" descr="A screenshot of a cell phone&#10;&#10;Description automatically generated">
-            <a:extLst>
-              <a:ext uri="{FF2B5EF4-FFF2-40B4-BE49-F238E27FC236}">
-                <a16:creationId xmlns:a16="http://schemas.microsoft.com/office/drawing/2014/main" id="{55130320-93E9-4928-8D3D-88B5FA347BC5}"/>
-              </a:ext>
-            </a:extLst>
-          </p:cNvPr>
-          <p:cNvPicPr>
-            <a:picLocks noChangeAspect="1"/>
-          </p:cNvPicPr>
-          <p:nvPr/>
-        </p:nvPicPr>
-        <p:blipFill rotWithShape="1">
-          <a:blip r:embed="rId5" cstate="print">
-            <a:extLst>
-              <a:ext uri="{28A0092B-C50C-407E-A947-70E740481C1C}">
-                <a14:useLocalDpi xmlns:a14="http://schemas.microsoft.com/office/drawing/2010/main" val="0"/>
-              </a:ext>
-            </a:extLst>
-          </a:blip>
-          <a:srcRect l="19196" t="12341" r="18661" b="52281"/>
-          <a:stretch/>
-        </p:blipFill>
-        <p:spPr>
-          <a:xfrm>
-            <a:off x="7386795" y="3565479"/>
-            <a:ext cx="3293215" cy="2426253"/>
-          </a:xfrm>
-          <a:prstGeom prst="rect">
-            <a:avLst/>
-          </a:prstGeom>
-          <a:ln w="19050">
-            <a:gradFill flip="none" rotWithShape="1">
-              <a:gsLst>
-                <a:gs pos="0">
-                  <a:schemeClr val="accent1">
-                    <a:lumMod val="5000"/>
-                    <a:lumOff val="95000"/>
-                  </a:schemeClr>
-                </a:gs>
-                <a:gs pos="74000">
-                  <a:schemeClr val="accent1">
-                    <a:lumMod val="45000"/>
-                    <a:lumOff val="55000"/>
-                  </a:schemeClr>
-                </a:gs>
-                <a:gs pos="83000">
-                  <a:schemeClr val="accent1">
-                    <a:lumMod val="45000"/>
-                    <a:lumOff val="55000"/>
-                  </a:schemeClr>
-                </a:gs>
-                <a:gs pos="100000">
-                  <a:schemeClr val="accent1">
-                    <a:lumMod val="30000"/>
-                    <a:lumOff val="70000"/>
-                  </a:schemeClr>
-                </a:gs>
-              </a:gsLst>
-              <a:lin ang="16200000" scaled="1"/>
-              <a:tileRect/>
-            </a:gradFill>
-          </a:ln>
-          <a:effectLst>
-            <a:outerShdw blurRad="50800" dist="38100" dir="2700000" algn="tl" rotWithShape="0">
-              <a:prstClr val="black">
-                <a:alpha val="40000"/>
-              </a:prstClr>
-            </a:outerShdw>
-          </a:effectLst>
-        </p:spPr>
-      </p:pic>
-    </p:spTree>
-    <p:extLst>
-      <p:ext uri="{BB962C8B-B14F-4D97-AF65-F5344CB8AC3E}">
-        <p14:creationId xmlns:p14="http://schemas.microsoft.com/office/powerpoint/2010/main" val="2441288283"/>
-      </p:ext>
-    </p:extLst>
-  </p:cSld>
-  <p:clrMapOvr>
-    <a:masterClrMapping/>
-  </p:clrMapOvr>
-</p:sld>
-</file>
-
-<file path=ppt/slides/slide6.xml><?xml version="1.0" encoding="utf-8"?>
-<p:sld xmlns:a="http://schemas.openxmlformats.org/drawingml/2006/main" xmlns:r="http://schemas.openxmlformats.org/officeDocument/2006/relationships" xmlns:p="http://schemas.openxmlformats.org/presentationml/2006/main">
-  <p:cSld>
-    <p:spTree>
-      <p:nvGrpSpPr>
-        <p:cNvPr id="1" name=""/>
-        <p:cNvGrpSpPr/>
-        <p:nvPr/>
-      </p:nvGrpSpPr>
-      <p:grpSpPr>
-        <a:xfrm>
-          <a:off x="0" y="0"/>
-          <a:ext cx="0" cy="0"/>
-          <a:chOff x="0" y="0"/>
-          <a:chExt cx="0" cy="0"/>
-        </a:xfrm>
-      </p:grpSpPr>
-      <p:sp>
-        <p:nvSpPr>
-          <p:cNvPr id="7" name="Title 6">
-            <a:extLst>
-              <a:ext uri="{FF2B5EF4-FFF2-40B4-BE49-F238E27FC236}">
-                <a16:creationId xmlns:a16="http://schemas.microsoft.com/office/drawing/2014/main" id="{29328965-75A8-4374-82D5-A2BF03690E41}"/>
-              </a:ext>
-            </a:extLst>
-          </p:cNvPr>
-          <p:cNvSpPr>
-            <a:spLocks noGrp="1"/>
-          </p:cNvSpPr>
-          <p:nvPr>
-            <p:ph type="title"/>
-          </p:nvPr>
-        </p:nvSpPr>
-        <p:spPr/>
-        <p:txBody>
-          <a:bodyPr/>
-          <a:lstStyle/>
-          <a:p>
-            <a:r>
-              <a:rPr lang="en-US" dirty="0"/>
-              <a:t>Some Observations</a:t>
-            </a:r>
-          </a:p>
-        </p:txBody>
-      </p:sp>
-      <p:sp>
-        <p:nvSpPr>
-          <p:cNvPr id="8" name="Content Placeholder 7">
-            <a:extLst>
-              <a:ext uri="{FF2B5EF4-FFF2-40B4-BE49-F238E27FC236}">
-                <a16:creationId xmlns:a16="http://schemas.microsoft.com/office/drawing/2014/main" id="{20324307-6414-484B-8953-D8554EF97306}"/>
-              </a:ext>
-            </a:extLst>
-          </p:cNvPr>
-          <p:cNvSpPr>
-            <a:spLocks noGrp="1"/>
-          </p:cNvSpPr>
-          <p:nvPr>
-            <p:ph idx="1"/>
-          </p:nvPr>
-        </p:nvSpPr>
-        <p:spPr/>
-        <p:txBody>
-          <a:bodyPr/>
-          <a:lstStyle/>
-          <a:p>
-            <a:r>
-              <a:rPr lang="en-US" dirty="0"/>
-              <a:t>Your code is likely to live longer than you expect, and may be used in ways you don’t expect by people you don’t know – plan for it!</a:t>
-            </a:r>
-          </a:p>
-          <a:p>
-            <a:r>
-              <a:rPr lang="en-US" dirty="0"/>
-              <a:t>Increasingly, consequential decisions are made based on computational results</a:t>
-            </a:r>
-          </a:p>
-          <a:p>
-            <a:pPr lvl="1"/>
-            <a:r>
-              <a:rPr lang="en-US" dirty="0"/>
-              <a:t>The codes generating those results may (justifiably) be subject to greater scrutiny</a:t>
-            </a:r>
-          </a:p>
-          <a:p>
-            <a:r>
-              <a:rPr lang="en-US" dirty="0"/>
-              <a:t>The scientific credibility of software is strongly connected to good software engineering practices</a:t>
-            </a:r>
-          </a:p>
-          <a:p>
-            <a:pPr lvl="1"/>
-            <a:r>
-              <a:rPr lang="en-US" dirty="0"/>
-              <a:t>Documentation</a:t>
-            </a:r>
-          </a:p>
-          <a:p>
-            <a:pPr lvl="1"/>
-            <a:r>
-              <a:rPr lang="en-US" dirty="0"/>
-              <a:t>Testing, verification, and (where possible) validation</a:t>
-            </a:r>
-          </a:p>
-          <a:p>
-            <a:pPr lvl="1"/>
-            <a:r>
-              <a:rPr lang="en-US" dirty="0"/>
-              <a:t>Code readability and quality metrics</a:t>
-            </a:r>
-          </a:p>
-        </p:txBody>
-      </p:sp>
-      <p:sp>
-        <p:nvSpPr>
-          <p:cNvPr id="9" name="TextBox 8">
-            <a:extLst>
-              <a:ext uri="{FF2B5EF4-FFF2-40B4-BE49-F238E27FC236}">
-                <a16:creationId xmlns:a16="http://schemas.microsoft.com/office/drawing/2014/main" id="{F7A973BB-506E-4A1B-8268-0ECF0419F34A}"/>
-              </a:ext>
-            </a:extLst>
-          </p:cNvPr>
-          <p:cNvSpPr txBox="1"/>
-          <p:nvPr/>
-        </p:nvSpPr>
-        <p:spPr>
-          <a:xfrm>
-            <a:off x="365760" y="5360406"/>
-            <a:ext cx="10869579" cy="849463"/>
-          </a:xfrm>
-          <a:prstGeom prst="rect">
-            <a:avLst/>
-          </a:prstGeom>
-          <a:noFill/>
-        </p:spPr>
-        <p:txBody>
-          <a:bodyPr wrap="none" lIns="118872" tIns="91440" rIns="118872" bIns="91440" rtlCol="0" anchor="ctr" anchorCtr="0">
-            <a:spAutoFit/>
-          </a:bodyPr>
-          <a:lstStyle/>
-          <a:p>
-            <a:pPr algn="l">
-              <a:lnSpc>
-                <a:spcPct val="90000"/>
-              </a:lnSpc>
-            </a:pPr>
-            <a:r>
-              <a:rPr lang="en-US" sz="2400" dirty="0">
-                <a:solidFill>
-                  <a:schemeClr val="tx2"/>
-                </a:solidFill>
-              </a:rPr>
-              <a:t>Question: Should we excuse scientific software for being “crappy stylistically”?</a:t>
-            </a:r>
-          </a:p>
-          <a:p>
-            <a:pPr algn="l">
-              <a:lnSpc>
-                <a:spcPct val="90000"/>
-              </a:lnSpc>
-            </a:pPr>
-            <a:r>
-              <a:rPr lang="en-US" sz="2400" dirty="0">
-                <a:solidFill>
-                  <a:schemeClr val="tx2">
-                    <a:lumMod val="40000"/>
-                    <a:lumOff val="60000"/>
-                  </a:schemeClr>
-                </a:solidFill>
-              </a:rPr>
-              <a:t>Hint: crappy code can hide bugs</a:t>
-            </a:r>
-          </a:p>
-        </p:txBody>
-      </p:sp>
-    </p:spTree>
-    <p:extLst>
-      <p:ext uri="{BB962C8B-B14F-4D97-AF65-F5344CB8AC3E}">
-        <p14:creationId xmlns:p14="http://schemas.microsoft.com/office/powerpoint/2010/main" val="739991148"/>
-      </p:ext>
-    </p:extLst>
-  </p:cSld>
-  <p:clrMapOvr>
-    <a:masterClrMapping/>
-  </p:clrMapOvr>
-</p:sld>
-</file>
-
-<file path=ppt/slides/slide7.xml><?xml version="1.0" encoding="utf-8"?>
-<p:sld xmlns:a="http://schemas.openxmlformats.org/drawingml/2006/main" xmlns:r="http://schemas.openxmlformats.org/officeDocument/2006/relationships" xmlns:p="http://schemas.openxmlformats.org/presentationml/2006/main">
-  <p:cSld>
-    <p:spTree>
-      <p:nvGrpSpPr>
-        <p:cNvPr id="1" name=""/>
-        <p:cNvGrpSpPr/>
-        <p:nvPr/>
-      </p:nvGrpSpPr>
-      <p:grpSpPr>
-        <a:xfrm>
-          <a:off x="0" y="0"/>
-          <a:ext cx="0" cy="0"/>
-          <a:chOff x="0" y="0"/>
-          <a:chExt cx="0" cy="0"/>
-        </a:xfrm>
-      </p:grpSpPr>
-      <p:sp>
-        <p:nvSpPr>
-          <p:cNvPr id="3" name="Content Placeholder 2">
-            <a:extLst>
-              <a:ext uri="{FF2B5EF4-FFF2-40B4-BE49-F238E27FC236}">
-                <a16:creationId xmlns:a16="http://schemas.microsoft.com/office/drawing/2014/main" id="{36733E54-E07F-40D0-AAF9-603545181CBC}"/>
-              </a:ext>
-            </a:extLst>
-          </p:cNvPr>
-          <p:cNvSpPr>
-            <a:spLocks noGrp="1"/>
-          </p:cNvSpPr>
-          <p:nvPr>
-            <p:ph idx="1"/>
-          </p:nvPr>
-        </p:nvSpPr>
-        <p:spPr>
-          <a:xfrm>
-            <a:off x="365760" y="1405111"/>
-            <a:ext cx="11369809" cy="4047778"/>
-          </a:xfrm>
-        </p:spPr>
-        <p:txBody>
-          <a:bodyPr anchor="ctr" anchorCtr="0"/>
-          <a:lstStyle/>
-          <a:p>
-            <a:pPr marL="0" indent="0" algn="ctr">
-              <a:buNone/>
-            </a:pPr>
-            <a:r>
-              <a:rPr lang="en-US" sz="4400" dirty="0"/>
-              <a:t>Science through computing is, </a:t>
-            </a:r>
-            <a:br>
-              <a:rPr lang="en-US" sz="4400" dirty="0"/>
-            </a:br>
-            <a:r>
-              <a:rPr lang="en-US" sz="4400" dirty="0"/>
-              <a:t>at best, </a:t>
-            </a:r>
-            <a:br>
-              <a:rPr lang="en-US" sz="4400" dirty="0"/>
-            </a:br>
-            <a:r>
-              <a:rPr lang="en-US" sz="4400" dirty="0"/>
-              <a:t>as credible as the software that produces it!</a:t>
-            </a:r>
-          </a:p>
-        </p:txBody>
-      </p:sp>
-    </p:spTree>
-    <p:extLst>
-      <p:ext uri="{BB962C8B-B14F-4D97-AF65-F5344CB8AC3E}">
-        <p14:creationId xmlns:p14="http://schemas.microsoft.com/office/powerpoint/2010/main" val="242292329"/>
-      </p:ext>
-    </p:extLst>
-  </p:cSld>
-  <p:clrMapOvr>
-    <a:masterClrMapping/>
-  </p:clrMapOvr>
-</p:sld>
-</file>
-
-<file path=ppt/slides/slide8.xml><?xml version="1.0" encoding="utf-8"?>
-<p:sld xmlns:a="http://schemas.openxmlformats.org/drawingml/2006/main" xmlns:r="http://schemas.openxmlformats.org/officeDocument/2006/relationships" xmlns:p="http://schemas.openxmlformats.org/presentationml/2006/main">
-  <p:cSld>
-    <p:spTree>
-      <p:nvGrpSpPr>
-        <p:cNvPr id="1" name=""/>
-        <p:cNvGrpSpPr/>
-        <p:nvPr/>
-      </p:nvGrpSpPr>
-      <p:grpSpPr>
-        <a:xfrm>
-          <a:off x="0" y="0"/>
-          <a:ext cx="0" cy="0"/>
-          <a:chOff x="0" y="0"/>
-          <a:chExt cx="0" cy="0"/>
-        </a:xfrm>
-      </p:grpSpPr>
-      <p:sp>
-        <p:nvSpPr>
-          <p:cNvPr id="2" name="Title 1">
-            <a:extLst>
-              <a:ext uri="{FF2B5EF4-FFF2-40B4-BE49-F238E27FC236}">
-                <a16:creationId xmlns:a16="http://schemas.microsoft.com/office/drawing/2014/main" id="{0DDB3257-4000-436D-A7C3-75FA1E751AA5}"/>
-              </a:ext>
-            </a:extLst>
-          </p:cNvPr>
-          <p:cNvSpPr>
-            <a:spLocks noGrp="1"/>
-          </p:cNvSpPr>
-          <p:nvPr>
-            <p:ph type="title"/>
-          </p:nvPr>
-        </p:nvSpPr>
-        <p:spPr/>
-        <p:txBody>
-          <a:bodyPr/>
-          <a:lstStyle/>
-          <a:p>
-            <a:r>
-              <a:rPr lang="en-US" dirty="0"/>
-              <a:t>Today, We Covered Many Topics…</a:t>
-            </a:r>
-          </a:p>
-        </p:txBody>
-      </p:sp>
-      <p:sp>
-        <p:nvSpPr>
-          <p:cNvPr id="3" name="Content Placeholder 2">
-            <a:extLst>
-              <a:ext uri="{FF2B5EF4-FFF2-40B4-BE49-F238E27FC236}">
-                <a16:creationId xmlns:a16="http://schemas.microsoft.com/office/drawing/2014/main" id="{83604F36-B0F4-4052-B41C-CEB4982754BF}"/>
-              </a:ext>
-            </a:extLst>
-          </p:cNvPr>
-          <p:cNvSpPr>
-            <a:spLocks noGrp="1"/>
-          </p:cNvSpPr>
-          <p:nvPr>
-            <p:ph idx="1"/>
-          </p:nvPr>
-        </p:nvSpPr>
-        <p:spPr/>
-        <p:txBody>
-          <a:bodyPr/>
-          <a:lstStyle/>
-          <a:p>
-            <a:r>
-              <a:rPr lang="en-US" dirty="0"/>
-              <a:t>Project management</a:t>
-            </a:r>
-          </a:p>
-          <a:p>
-            <a:r>
-              <a:rPr lang="en-US" dirty="0"/>
-              <a:t>Collaboration around software development</a:t>
-            </a:r>
-          </a:p>
-          <a:p>
-            <a:r>
-              <a:rPr lang="en-US" dirty="0"/>
-              <a:t>Designing software for flexibility and extensibility</a:t>
-            </a:r>
-          </a:p>
-          <a:p>
-            <a:r>
-              <a:rPr lang="en-US" dirty="0"/>
-              <a:t>Testing strategies for complex software systems</a:t>
-            </a:r>
-          </a:p>
-          <a:p>
-            <a:r>
-              <a:rPr lang="en-US" dirty="0"/>
-              <a:t>Systematic refactoring of large, complex software systems</a:t>
-            </a:r>
-          </a:p>
-          <a:p>
-            <a:r>
-              <a:rPr lang="en-US" dirty="0"/>
-              <a:t>Continuous integration testing</a:t>
-            </a:r>
-          </a:p>
-          <a:p>
-            <a:r>
-              <a:rPr lang="en-US" dirty="0"/>
-              <a:t>Reproducibility</a:t>
-            </a:r>
-          </a:p>
-        </p:txBody>
-      </p:sp>
-    </p:spTree>
-    <p:extLst>
-      <p:ext uri="{BB962C8B-B14F-4D97-AF65-F5344CB8AC3E}">
-        <p14:creationId xmlns:p14="http://schemas.microsoft.com/office/powerpoint/2010/main" val="4009266668"/>
-      </p:ext>
-    </p:extLst>
-  </p:cSld>
-  <p:clrMapOvr>
-    <a:masterClrMapping/>
-  </p:clrMapOvr>
-</p:sld>
-</file>
-
-<file path=ppt/slides/slide9.xml><?xml version="1.0" encoding="utf-8"?>
-<p:sld xmlns:a="http://schemas.openxmlformats.org/drawingml/2006/main" xmlns:r="http://schemas.openxmlformats.org/officeDocument/2006/relationships" xmlns:p="http://schemas.openxmlformats.org/presentationml/2006/main">
-  <p:cSld>
-    <p:spTree>
-      <p:nvGrpSpPr>
-        <p:cNvPr id="1" name=""/>
-        <p:cNvGrpSpPr/>
-        <p:nvPr/>
-      </p:nvGrpSpPr>
-      <p:grpSpPr>
-        <a:xfrm>
-          <a:off x="0" y="0"/>
-          <a:ext cx="0" cy="0"/>
-          <a:chOff x="0" y="0"/>
-          <a:chExt cx="0" cy="0"/>
-        </a:xfrm>
-      </p:grpSpPr>
-      <p:sp>
-        <p:nvSpPr>
-          <p:cNvPr id="2" name="Title 1">
-            <a:extLst>
-              <a:ext uri="{FF2B5EF4-FFF2-40B4-BE49-F238E27FC236}">
-                <a16:creationId xmlns:a16="http://schemas.microsoft.com/office/drawing/2014/main" id="{4716E6A3-96EC-4523-A436-014C2E270151}"/>
-              </a:ext>
-            </a:extLst>
-          </p:cNvPr>
-          <p:cNvSpPr>
-            <a:spLocks noGrp="1"/>
-          </p:cNvSpPr>
-          <p:nvPr>
-            <p:ph type="title"/>
-          </p:nvPr>
-        </p:nvSpPr>
-        <p:spPr/>
-        <p:txBody>
-          <a:bodyPr/>
-          <a:lstStyle/>
-          <a:p>
-            <a:r>
-              <a:rPr lang="en-US" dirty="0"/>
-              <a:t>And there are Many More We Didn’t Have Time For</a:t>
-            </a:r>
-          </a:p>
-        </p:txBody>
-      </p:sp>
-      <p:sp>
-        <p:nvSpPr>
-          <p:cNvPr id="3" name="Content Placeholder 2">
-            <a:extLst>
-              <a:ext uri="{FF2B5EF4-FFF2-40B4-BE49-F238E27FC236}">
-                <a16:creationId xmlns:a16="http://schemas.microsoft.com/office/drawing/2014/main" id="{BD1F1B50-97F3-4784-88FE-6A4FC215ACCF}"/>
-              </a:ext>
-            </a:extLst>
-          </p:cNvPr>
-          <p:cNvSpPr>
-            <a:spLocks noGrp="1"/>
-          </p:cNvSpPr>
-          <p:nvPr>
-            <p:ph sz="half" idx="2"/>
-          </p:nvPr>
-        </p:nvSpPr>
-        <p:spPr>
-          <a:xfrm>
-            <a:off x="457200" y="1217891"/>
-            <a:ext cx="5588582" cy="3373229"/>
-          </a:xfrm>
-          <a:ln>
-            <a:noFill/>
-          </a:ln>
-        </p:spPr>
-        <p:txBody>
-          <a:bodyPr/>
-          <a:lstStyle/>
-          <a:p>
-            <a:pPr>
-              <a:spcBef>
-                <a:spcPts val="800"/>
-              </a:spcBef>
-            </a:pPr>
-            <a:r>
-              <a:rPr lang="en-US" dirty="0"/>
-              <a:t>Documentation</a:t>
-            </a:r>
-          </a:p>
-          <a:p>
-            <a:pPr>
-              <a:spcBef>
-                <a:spcPts val="800"/>
-              </a:spcBef>
-            </a:pPr>
-            <a:r>
-              <a:rPr lang="en-US" dirty="0"/>
-              <a:t>Licensing</a:t>
-            </a:r>
-          </a:p>
-          <a:p>
-            <a:pPr>
-              <a:spcBef>
-                <a:spcPts val="800"/>
-              </a:spcBef>
-            </a:pPr>
-            <a:r>
-              <a:rPr lang="en-US" dirty="0"/>
-              <a:t>Packaging and distribution</a:t>
-            </a:r>
-          </a:p>
-          <a:p>
-            <a:pPr>
-              <a:spcBef>
-                <a:spcPts val="800"/>
-              </a:spcBef>
-            </a:pPr>
-            <a:r>
-              <a:rPr lang="en-US" dirty="0"/>
-              <a:t>Issue tracking</a:t>
-            </a:r>
-          </a:p>
-          <a:p>
-            <a:pPr>
-              <a:spcBef>
-                <a:spcPts val="800"/>
-              </a:spcBef>
-            </a:pPr>
-            <a:r>
-              <a:rPr lang="en-US" dirty="0"/>
-              <a:t>Configuration and build</a:t>
-            </a:r>
-          </a:p>
-          <a:p>
-            <a:pPr>
-              <a:spcBef>
-                <a:spcPts val="800"/>
-              </a:spcBef>
-            </a:pPr>
-            <a:r>
-              <a:rPr lang="en-US" dirty="0"/>
-              <a:t>Debugging strategies</a:t>
-            </a:r>
-          </a:p>
-          <a:p>
-            <a:pPr>
-              <a:spcBef>
-                <a:spcPts val="800"/>
-              </a:spcBef>
-            </a:pPr>
-            <a:r>
-              <a:rPr lang="en-US" dirty="0"/>
-              <a:t>Building and sustaining communities around software</a:t>
-            </a:r>
-          </a:p>
-          <a:p>
-            <a:pPr>
-              <a:spcBef>
-                <a:spcPts val="800"/>
-              </a:spcBef>
-            </a:pPr>
-            <a:r>
-              <a:rPr lang="en-US" dirty="0"/>
-              <a:t>Software publication and citation</a:t>
-            </a:r>
-          </a:p>
-          <a:p>
-            <a:pPr>
-              <a:spcBef>
-                <a:spcPts val="800"/>
-              </a:spcBef>
-            </a:pPr>
-            <a:r>
-              <a:rPr lang="en-US" dirty="0"/>
-              <a:t>Requirements gathering</a:t>
-            </a:r>
-          </a:p>
-          <a:p>
-            <a:pPr>
-              <a:spcBef>
-                <a:spcPts val="800"/>
-              </a:spcBef>
-            </a:pPr>
-            <a:r>
-              <a:rPr lang="en-US" dirty="0"/>
-              <a:t>Understanding and debugging floating-point math</a:t>
-            </a:r>
-          </a:p>
-          <a:p>
-            <a:pPr>
-              <a:spcBef>
-                <a:spcPts val="800"/>
-              </a:spcBef>
-            </a:pPr>
-            <a:r>
-              <a:rPr lang="en-US" dirty="0"/>
-              <a:t>Performance and performance portability</a:t>
-            </a:r>
-          </a:p>
-          <a:p>
-            <a:pPr>
-              <a:spcBef>
-                <a:spcPts val="800"/>
-              </a:spcBef>
-            </a:pPr>
-            <a:r>
-              <a:rPr lang="en-US" dirty="0"/>
-              <a:t>…</a:t>
-            </a:r>
-          </a:p>
-        </p:txBody>
-      </p:sp>
-      <p:sp>
-        <p:nvSpPr>
-          <p:cNvPr id="7" name="Content Placeholder 6">
-            <a:extLst>
-              <a:ext uri="{FF2B5EF4-FFF2-40B4-BE49-F238E27FC236}">
-                <a16:creationId xmlns:a16="http://schemas.microsoft.com/office/drawing/2014/main" id="{F1C4C0C8-A19F-42A3-BF4E-B009E8F99501}"/>
-              </a:ext>
-            </a:extLst>
-          </p:cNvPr>
-          <p:cNvSpPr>
-            <a:spLocks noGrp="1"/>
-          </p:cNvSpPr>
-          <p:nvPr>
-            <p:ph sz="quarter" idx="4"/>
-          </p:nvPr>
-        </p:nvSpPr>
-        <p:spPr>
-          <a:xfrm>
-            <a:off x="6218914" y="1217891"/>
-            <a:ext cx="5531934" cy="3373229"/>
-          </a:xfrm>
-          <a:ln>
-            <a:noFill/>
-          </a:ln>
-        </p:spPr>
-        <p:txBody>
-          <a:bodyPr/>
-          <a:lstStyle/>
-          <a:p>
-            <a:pPr>
-              <a:spcBef>
-                <a:spcPts val="2400"/>
-              </a:spcBef>
-            </a:pPr>
-            <a:r>
-              <a:rPr lang="en-US" b="1" dirty="0">
-                <a:solidFill>
-                  <a:schemeClr val="tx2"/>
-                </a:solidFill>
-              </a:rPr>
-              <a:t>Also important topics, but…</a:t>
-            </a:r>
-          </a:p>
-          <a:p>
-            <a:pPr>
-              <a:spcBef>
-                <a:spcPts val="800"/>
-              </a:spcBef>
-            </a:pPr>
-            <a:r>
-              <a:rPr lang="en-US" dirty="0">
-                <a:solidFill>
-                  <a:schemeClr val="tx2"/>
-                </a:solidFill>
-              </a:rPr>
-              <a:t>Less distinction between research software and other software</a:t>
-            </a:r>
-          </a:p>
-          <a:p>
-            <a:pPr>
-              <a:spcBef>
-                <a:spcPts val="800"/>
-              </a:spcBef>
-            </a:pPr>
-            <a:r>
-              <a:rPr lang="en-US" dirty="0">
-                <a:solidFill>
-                  <a:schemeClr val="tx2"/>
-                </a:solidFill>
-              </a:rPr>
-              <a:t>More informational resources available</a:t>
-            </a:r>
-          </a:p>
-          <a:p>
-            <a:pPr>
-              <a:spcBef>
-                <a:spcPts val="800"/>
-              </a:spcBef>
-            </a:pPr>
-            <a:r>
-              <a:rPr lang="en-US" dirty="0">
-                <a:solidFill>
-                  <a:schemeClr val="tx2"/>
-                </a:solidFill>
-              </a:rPr>
-              <a:t>Next-level concerns for starting researchers</a:t>
-            </a:r>
-          </a:p>
-          <a:p>
-            <a:pPr>
-              <a:spcBef>
-                <a:spcPts val="800"/>
-              </a:spcBef>
-            </a:pPr>
-            <a:r>
-              <a:rPr lang="en-US" dirty="0">
-                <a:solidFill>
-                  <a:schemeClr val="tx2"/>
-                </a:solidFill>
-              </a:rPr>
-              <a:t>There’s only so much time in the day!</a:t>
-            </a:r>
-          </a:p>
-          <a:p>
-            <a:endParaRPr lang="en-US" dirty="0"/>
-          </a:p>
-        </p:txBody>
-      </p:sp>
-    </p:spTree>
-    <p:extLst>
-      <p:ext uri="{BB962C8B-B14F-4D97-AF65-F5344CB8AC3E}">
-        <p14:creationId xmlns:p14="http://schemas.microsoft.com/office/powerpoint/2010/main" val="4072028838"/>
       </p:ext>
     </p:extLst>
   </p:cSld>
@@ -8578,9 +7089,12 @@
 </file>
 
 <file path=customXml/item1.xml><?xml version="1.0" encoding="utf-8"?>
-<p:properties xmlns:p="http://schemas.microsoft.com/office/2006/metadata/properties" xmlns:xsi="http://www.w3.org/2001/XMLSchema-instance" xmlns:pc="http://schemas.microsoft.com/office/infopath/2007/PartnerControls">
-  <documentManagement/>
-</p:properties>
+<?mso-contentType ?>
+<FormTemplates xmlns="http://schemas.microsoft.com/sharepoint/v3/contenttype/forms">
+  <Display>DocumentLibraryForm</Display>
+  <Edit>DocumentLibraryForm</Edit>
+  <New>DocumentLibraryForm</New>
+</FormTemplates>
 </file>
 
 <file path=customXml/item2.xml><?xml version="1.0" encoding="utf-8"?>
@@ -8633,25 +7147,15 @@
 </file>
 
 <file path=customXml/item3.xml><?xml version="1.0" encoding="utf-8"?>
-<?mso-contentType ?>
-<FormTemplates xmlns="http://schemas.microsoft.com/sharepoint/v3/contenttype/forms">
-  <Display>DocumentLibraryForm</Display>
-  <Edit>DocumentLibraryForm</Edit>
-  <New>DocumentLibraryForm</New>
-</FormTemplates>
+<p:properties xmlns:p="http://schemas.microsoft.com/office/2006/metadata/properties" xmlns:xsi="http://www.w3.org/2001/XMLSchema-instance" xmlns:pc="http://schemas.microsoft.com/office/infopath/2007/PartnerControls">
+  <documentManagement/>
+</p:properties>
 </file>
 
 <file path=customXml/itemProps1.xml><?xml version="1.0" encoding="utf-8"?>
-<ds:datastoreItem xmlns:ds="http://schemas.openxmlformats.org/officeDocument/2006/customXml" ds:itemID="{A50EC660-24D0-43A0-AE5E-E274115E726B}">
+<ds:datastoreItem xmlns:ds="http://schemas.openxmlformats.org/officeDocument/2006/customXml" ds:itemID="{19E20559-B232-4371-8690-E3D8007EDB82}">
   <ds:schemaRefs>
-    <ds:schemaRef ds:uri="http://purl.org/dc/terms/"/>
-    <ds:schemaRef ds:uri="http://schemas.openxmlformats.org/package/2006/metadata/core-properties"/>
-    <ds:schemaRef ds:uri="http://schemas.microsoft.com/office/2006/documentManagement/types"/>
-    <ds:schemaRef ds:uri="http://purl.org/dc/elements/1.1/"/>
-    <ds:schemaRef ds:uri="http://schemas.microsoft.com/office/2006/metadata/properties"/>
-    <ds:schemaRef ds:uri="http://www.w3.org/XML/1998/namespace"/>
-    <ds:schemaRef ds:uri="http://purl.org/dc/dcmitype/"/>
-    <ds:schemaRef ds:uri="http://schemas.microsoft.com/office/infopath/2007/PartnerControls"/>
+    <ds:schemaRef ds:uri="http://schemas.microsoft.com/sharepoint/v3/contenttype/forms"/>
   </ds:schemaRefs>
 </ds:datastoreItem>
 </file>
@@ -8672,9 +7176,16 @@
 </file>
 
 <file path=customXml/itemProps3.xml><?xml version="1.0" encoding="utf-8"?>
-<ds:datastoreItem xmlns:ds="http://schemas.openxmlformats.org/officeDocument/2006/customXml" ds:itemID="{19E20559-B232-4371-8690-E3D8007EDB82}">
+<ds:datastoreItem xmlns:ds="http://schemas.openxmlformats.org/officeDocument/2006/customXml" ds:itemID="{A50EC660-24D0-43A0-AE5E-E274115E726B}">
   <ds:schemaRefs>
-    <ds:schemaRef ds:uri="http://schemas.microsoft.com/sharepoint/v3/contenttype/forms"/>
+    <ds:schemaRef ds:uri="http://purl.org/dc/terms/"/>
+    <ds:schemaRef ds:uri="http://schemas.openxmlformats.org/package/2006/metadata/core-properties"/>
+    <ds:schemaRef ds:uri="http://schemas.microsoft.com/office/2006/documentManagement/types"/>
+    <ds:schemaRef ds:uri="http://purl.org/dc/elements/1.1/"/>
+    <ds:schemaRef ds:uri="http://schemas.microsoft.com/office/2006/metadata/properties"/>
+    <ds:schemaRef ds:uri="http://www.w3.org/XML/1998/namespace"/>
+    <ds:schemaRef ds:uri="http://purl.org/dc/dcmitype/"/>
+    <ds:schemaRef ds:uri="http://schemas.microsoft.com/office/infopath/2007/PartnerControls"/>
   </ds:schemaRefs>
 </ds:datastoreItem>
 </file>
</xml_diff>